<commit_message>
add mediator, refactor test/
</commit_message>
<xml_diff>
--- a/doc/SoftwareDesign/Architecture-P4.pptx
+++ b/doc/SoftwareDesign/Architecture-P4.pptx
@@ -5,7 +5,7 @@
     <p:sldMasterId id="2147483648" r:id="rId1"/>
   </p:sldMasterIdLst>
   <p:notesMasterIdLst>
-    <p:notesMasterId r:id="rId7"/>
+    <p:notesMasterId r:id="rId8"/>
   </p:notesMasterIdLst>
   <p:sldIdLst>
     <p:sldId id="256" r:id="rId2"/>
@@ -13,6 +13,7 @@
     <p:sldId id="306" r:id="rId4"/>
     <p:sldId id="308" r:id="rId5"/>
     <p:sldId id="307" r:id="rId6"/>
+    <p:sldId id="301" r:id="rId7"/>
   </p:sldIdLst>
   <p:sldSz cx="12192000" cy="6858000"/>
   <p:notesSz cx="6858000" cy="9144000"/>
@@ -627,6 +628,2179 @@
     <p:extLst>
       <p:ext uri="{BB962C8B-B14F-4D97-AF65-F5344CB8AC3E}">
         <p14:creationId xmlns:p14="http://schemas.microsoft.com/office/powerpoint/2010/main" val="825882882"/>
+      </p:ext>
+    </p:extLst>
+  </p:cSld>
+  <p:clrMapOvr>
+    <a:masterClrMapping/>
+  </p:clrMapOvr>
+</p:notes>
+</file>
+
+<file path=ppt/notesSlides/notesSlide3.xml><?xml version="1.0" encoding="utf-8"?>
+<p:notes xmlns:a="http://schemas.openxmlformats.org/drawingml/2006/main" xmlns:r="http://schemas.openxmlformats.org/officeDocument/2006/relationships" xmlns:p="http://schemas.openxmlformats.org/presentationml/2006/main">
+  <p:cSld>
+    <p:spTree>
+      <p:nvGrpSpPr>
+        <p:cNvPr id="1" name=""/>
+        <p:cNvGrpSpPr/>
+        <p:nvPr/>
+      </p:nvGrpSpPr>
+      <p:grpSpPr>
+        <a:xfrm>
+          <a:off x="0" y="0"/>
+          <a:ext cx="0" cy="0"/>
+          <a:chOff x="0" y="0"/>
+          <a:chExt cx="0" cy="0"/>
+        </a:xfrm>
+      </p:grpSpPr>
+      <p:sp>
+        <p:nvSpPr>
+          <p:cNvPr id="2" name="幻灯片图像占位符 1"/>
+          <p:cNvSpPr>
+            <a:spLocks noGrp="1" noRot="1" noChangeAspect="1"/>
+          </p:cNvSpPr>
+          <p:nvPr>
+            <p:ph type="sldImg"/>
+          </p:nvPr>
+        </p:nvSpPr>
+        <p:spPr/>
+      </p:sp>
+      <p:sp>
+        <p:nvSpPr>
+          <p:cNvPr id="3" name="备注占位符 2"/>
+          <p:cNvSpPr>
+            <a:spLocks noGrp="1"/>
+          </p:cNvSpPr>
+          <p:nvPr>
+            <p:ph type="body" idx="1"/>
+          </p:nvPr>
+        </p:nvSpPr>
+        <p:spPr/>
+        <p:txBody>
+          <a:bodyPr/>
+          <a:lstStyle/>
+          <a:p>
+            <a:r>
+              <a:rPr lang="en-US" altLang="zh-CN" dirty="0" err="1"/>
+              <a:t>VNFaaS</a:t>
+            </a:r>
+            <a:r>
+              <a:rPr lang="en-US" altLang="zh-CN" dirty="0"/>
+              <a:t> - </a:t>
+            </a:r>
+            <a:r>
+              <a:rPr lang="zh-CN" altLang="en-US" dirty="0"/>
+              <a:t>外网用户访问</a:t>
+            </a:r>
+            <a:r>
+              <a:rPr lang="en-US" altLang="zh-CN" dirty="0"/>
+              <a:t>DCN</a:t>
+            </a:r>
+            <a:r>
+              <a:rPr lang="zh-CN" altLang="en-US" dirty="0"/>
+              <a:t>的</a:t>
+            </a:r>
+            <a:r>
+              <a:rPr lang="en-US" altLang="zh-CN" dirty="0"/>
+              <a:t>Website</a:t>
+            </a:r>
+          </a:p>
+          <a:p>
+            <a:endParaRPr lang="en-US" altLang="zh-CN" dirty="0"/>
+          </a:p>
+          <a:p>
+            <a:r>
+              <a:rPr lang="zh-CN" altLang="en-US" dirty="0"/>
+              <a:t>此图为</a:t>
+            </a:r>
+            <a:r>
+              <a:rPr lang="en-US" altLang="zh-CN" dirty="0" err="1"/>
+              <a:t>mininet</a:t>
+            </a:r>
+            <a:r>
+              <a:rPr lang="zh-CN" altLang="en-US" dirty="0"/>
+              <a:t>原型系统设置，所有的</a:t>
+            </a:r>
+            <a:r>
+              <a:rPr lang="en-US" altLang="zh-CN" dirty="0"/>
+              <a:t>KVM bridge</a:t>
+            </a:r>
+            <a:r>
+              <a:rPr lang="zh-CN" altLang="en-US" dirty="0"/>
+              <a:t>可以理解为网线（注意所有和</a:t>
+            </a:r>
+            <a:r>
+              <a:rPr lang="en-US" altLang="zh-CN" dirty="0"/>
+              <a:t>KVM bridge</a:t>
+            </a:r>
+            <a:r>
+              <a:rPr lang="zh-CN" altLang="en-US" dirty="0"/>
+              <a:t>连接的</a:t>
+            </a:r>
+            <a:r>
+              <a:rPr lang="en-US" altLang="zh-CN" dirty="0"/>
+              <a:t>VM</a:t>
+            </a:r>
+            <a:r>
+              <a:rPr lang="zh-CN" altLang="en-US" dirty="0"/>
+              <a:t>需要删除对应</a:t>
+            </a:r>
+            <a:r>
+              <a:rPr lang="en-US" altLang="zh-CN" dirty="0"/>
+              <a:t>bridge</a:t>
+            </a:r>
+            <a:r>
+              <a:rPr lang="zh-CN" altLang="en-US" dirty="0"/>
+              <a:t>的默认</a:t>
+            </a:r>
+            <a:r>
+              <a:rPr lang="en-US" altLang="zh-CN" dirty="0"/>
+              <a:t>route</a:t>
+            </a:r>
+            <a:r>
+              <a:rPr lang="zh-CN" altLang="en-US" dirty="0"/>
+              <a:t>）</a:t>
+            </a:r>
+            <a:endParaRPr lang="en-US" altLang="zh-CN" dirty="0"/>
+          </a:p>
+          <a:p>
+            <a:endParaRPr lang="en-US" altLang="zh-CN" dirty="0"/>
+          </a:p>
+          <a:p>
+            <a:r>
+              <a:rPr lang="en-US" altLang="zh-CN" dirty="0"/>
+              <a:t>Ingress</a:t>
+            </a:r>
+            <a:r>
+              <a:rPr lang="zh-CN" altLang="en-US" dirty="0"/>
+              <a:t>表示</a:t>
+            </a:r>
+            <a:r>
+              <a:rPr lang="en-US" altLang="zh-CN" dirty="0"/>
+              <a:t>peer switch</a:t>
+            </a:r>
+            <a:r>
+              <a:rPr lang="zh-CN" altLang="en-US" dirty="0"/>
+              <a:t>（运行</a:t>
+            </a:r>
+            <a:r>
+              <a:rPr lang="en-US" altLang="zh-CN" dirty="0" err="1"/>
+              <a:t>pktgen</a:t>
+            </a:r>
+            <a:r>
+              <a:rPr lang="zh-CN" altLang="en-US" dirty="0"/>
+              <a:t>）</a:t>
+            </a:r>
+            <a:endParaRPr lang="en-US" altLang="zh-CN" dirty="0"/>
+          </a:p>
+          <a:p>
+            <a:r>
+              <a:rPr lang="zh-CN" altLang="en-US" dirty="0"/>
+              <a:t>生成流量：</a:t>
+            </a:r>
+            <a:r>
+              <a:rPr lang="en-US" altLang="zh-CN" dirty="0" err="1"/>
+              <a:t>src</a:t>
+            </a:r>
+            <a:r>
+              <a:rPr lang="en-US" altLang="zh-CN" dirty="0"/>
+              <a:t> </a:t>
+            </a:r>
+            <a:r>
+              <a:rPr lang="en-US" altLang="zh-CN" dirty="0" err="1"/>
+              <a:t>ip</a:t>
+            </a:r>
+            <a:r>
+              <a:rPr lang="en-US" altLang="zh-CN" dirty="0"/>
+              <a:t> range from 1.1.1.1 to 9.255.255.254</a:t>
+            </a:r>
+            <a:r>
+              <a:rPr lang="zh-CN" altLang="en-US" dirty="0"/>
+              <a:t>， </a:t>
+            </a:r>
+            <a:r>
+              <a:rPr lang="en-US" altLang="zh-CN" dirty="0" err="1"/>
+              <a:t>dst</a:t>
+            </a:r>
+            <a:r>
+              <a:rPr lang="en-US" altLang="zh-CN" dirty="0"/>
+              <a:t> </a:t>
+            </a:r>
+            <a:r>
+              <a:rPr lang="en-US" altLang="zh-CN" dirty="0" err="1"/>
+              <a:t>ip</a:t>
+            </a:r>
+            <a:r>
+              <a:rPr lang="en-US" altLang="zh-CN" dirty="0"/>
+              <a:t> range from 11.1.1.1 to 19.255.255.254</a:t>
+            </a:r>
+          </a:p>
+          <a:p>
+            <a:r>
+              <a:rPr lang="en-US" altLang="zh-CN" dirty="0" err="1"/>
+              <a:t>src</a:t>
+            </a:r>
+            <a:r>
+              <a:rPr lang="en-US" altLang="zh-CN" dirty="0"/>
+              <a:t> mac</a:t>
+            </a:r>
+            <a:r>
+              <a:rPr lang="zh-CN" altLang="en-US" dirty="0"/>
+              <a:t>填写</a:t>
+            </a:r>
+            <a:r>
+              <a:rPr lang="en-US" altLang="zh-CN" dirty="0"/>
+              <a:t>peer switch</a:t>
+            </a:r>
+            <a:r>
+              <a:rPr lang="zh-CN" altLang="en-US" dirty="0"/>
+              <a:t>的</a:t>
+            </a:r>
+            <a:r>
+              <a:rPr lang="en-US" altLang="zh-CN" dirty="0"/>
+              <a:t>MAC</a:t>
+            </a:r>
+            <a:r>
+              <a:rPr lang="zh-CN" altLang="en-US" dirty="0"/>
+              <a:t>，</a:t>
+            </a:r>
+            <a:r>
+              <a:rPr lang="en-US" altLang="zh-CN" dirty="0" err="1"/>
+              <a:t>dst</a:t>
+            </a:r>
+            <a:r>
+              <a:rPr lang="en-US" altLang="zh-CN" dirty="0"/>
+              <a:t> mac</a:t>
+            </a:r>
+            <a:r>
+              <a:rPr lang="zh-CN" altLang="en-US" dirty="0"/>
+              <a:t>填写</a:t>
+            </a:r>
+            <a:r>
+              <a:rPr lang="en-US" altLang="zh-CN" dirty="0"/>
+              <a:t>DCN Gateway</a:t>
+            </a:r>
+            <a:r>
+              <a:rPr lang="zh-CN" altLang="en-US" dirty="0"/>
+              <a:t>的</a:t>
+            </a:r>
+            <a:r>
+              <a:rPr lang="en-US" altLang="zh-CN" dirty="0"/>
+              <a:t>MAC</a:t>
+            </a:r>
+            <a:r>
+              <a:rPr lang="zh-CN" altLang="en-US" dirty="0"/>
+              <a:t>。</a:t>
+            </a:r>
+            <a:endParaRPr lang="en-US" altLang="zh-CN" dirty="0"/>
+          </a:p>
+          <a:p>
+            <a:r>
+              <a:rPr lang="en-US" altLang="zh-CN" dirty="0"/>
+              <a:t>Default gateway</a:t>
+            </a:r>
+            <a:r>
+              <a:rPr lang="zh-CN" altLang="en-US" dirty="0"/>
+              <a:t>选其中一个，如果</a:t>
+            </a:r>
+            <a:r>
+              <a:rPr lang="en-US" altLang="zh-CN" dirty="0"/>
+              <a:t>default gateway</a:t>
+            </a:r>
+            <a:r>
+              <a:rPr lang="zh-CN" altLang="en-US" dirty="0"/>
+              <a:t>故障，发给另一个。</a:t>
+            </a:r>
+            <a:endParaRPr lang="en-US" altLang="zh-CN" dirty="0"/>
+          </a:p>
+          <a:p>
+            <a:endParaRPr lang="en-US" altLang="zh-CN" dirty="0"/>
+          </a:p>
+          <a:p>
+            <a:r>
+              <a:rPr lang="en-US" altLang="zh-CN" dirty="0"/>
+              <a:t>DCN Gateway</a:t>
+            </a:r>
+            <a:r>
+              <a:rPr lang="zh-CN" altLang="en-US" dirty="0"/>
+              <a:t>是一个三层交换机</a:t>
+            </a:r>
+            <a:r>
+              <a:rPr lang="en-US" altLang="zh-CN" dirty="0"/>
+              <a:t>(</a:t>
+            </a:r>
+            <a:r>
+              <a:rPr lang="zh-CN" altLang="en-US" dirty="0"/>
+              <a:t>无状态</a:t>
+            </a:r>
+            <a:r>
+              <a:rPr lang="en-US" altLang="zh-CN" dirty="0"/>
+              <a:t>)</a:t>
+            </a:r>
+          </a:p>
+          <a:p>
+            <a:r>
+              <a:rPr lang="zh-CN" altLang="en-US" dirty="0"/>
+              <a:t>三层交换机的流表规则：</a:t>
+            </a:r>
+            <a:endParaRPr lang="en-US" altLang="zh-CN" dirty="0"/>
+          </a:p>
+          <a:p>
+            <a:pPr marL="0" marR="0" lvl="0" indent="0" algn="l" defTabSz="914400" rtl="0" eaLnBrk="1" fontAlgn="auto" latinLnBrk="0" hangingPunct="1">
+              <a:lnSpc>
+                <a:spcPct val="100000"/>
+              </a:lnSpc>
+              <a:spcBef>
+                <a:spcPts val="0"/>
+              </a:spcBef>
+              <a:spcAft>
+                <a:spcPts val="0"/>
+              </a:spcAft>
+              <a:buClrTx/>
+              <a:buSzTx/>
+              <a:buFontTx/>
+              <a:buNone/>
+              <a:tabLst/>
+              <a:defRPr/>
+            </a:pPr>
+            <a:r>
+              <a:rPr lang="zh-CN" altLang="en-US" dirty="0"/>
+              <a:t>配置</a:t>
+            </a:r>
+            <a:r>
+              <a:rPr lang="en-US" altLang="zh-CN" dirty="0"/>
+              <a:t>L2</a:t>
+            </a:r>
+            <a:r>
+              <a:rPr lang="zh-CN" altLang="en-US" dirty="0"/>
+              <a:t>转发规则：</a:t>
+            </a:r>
+            <a:endParaRPr lang="en-US" altLang="zh-CN" dirty="0"/>
+          </a:p>
+          <a:p>
+            <a:pPr marL="0" marR="0" lvl="0" indent="0" algn="l" defTabSz="914400" rtl="0" eaLnBrk="1" fontAlgn="auto" latinLnBrk="0" hangingPunct="1">
+              <a:lnSpc>
+                <a:spcPct val="100000"/>
+              </a:lnSpc>
+              <a:spcBef>
+                <a:spcPts val="0"/>
+              </a:spcBef>
+              <a:spcAft>
+                <a:spcPts val="0"/>
+              </a:spcAft>
+              <a:buClrTx/>
+              <a:buSzTx/>
+              <a:buFontTx/>
+              <a:buNone/>
+              <a:tabLst/>
+              <a:defRPr/>
+            </a:pPr>
+            <a:r>
+              <a:rPr lang="en-US" altLang="zh-CN" dirty="0"/>
+              <a:t>	</a:t>
+            </a:r>
+            <a:r>
+              <a:rPr lang="zh-CN" altLang="en-US" dirty="0"/>
+              <a:t>如果</a:t>
+            </a:r>
+            <a:r>
+              <a:rPr lang="en-US" altLang="zh-CN" dirty="0" err="1"/>
+              <a:t>dst</a:t>
+            </a:r>
+            <a:r>
+              <a:rPr lang="en-US" altLang="zh-CN" dirty="0"/>
+              <a:t> mac</a:t>
+            </a:r>
+            <a:r>
+              <a:rPr lang="zh-CN" altLang="en-US" dirty="0"/>
+              <a:t>不是这台</a:t>
+            </a:r>
+            <a:r>
+              <a:rPr lang="en-US" altLang="zh-CN" dirty="0"/>
+              <a:t>L3 switch </a:t>
+            </a:r>
+            <a:r>
+              <a:rPr lang="en-US" altLang="zh-CN" dirty="0" err="1"/>
+              <a:t>nic</a:t>
+            </a:r>
+            <a:r>
+              <a:rPr lang="en-US" altLang="zh-CN" dirty="0"/>
+              <a:t> mac</a:t>
+            </a:r>
+            <a:r>
+              <a:rPr lang="zh-CN" altLang="en-US" dirty="0"/>
+              <a:t>（包括广播帧）：转发</a:t>
+            </a:r>
+            <a:r>
+              <a:rPr lang="en-US" altLang="zh-CN" dirty="0"/>
+              <a:t>frame</a:t>
+            </a:r>
+            <a:r>
+              <a:rPr lang="zh-CN" altLang="en-US" dirty="0"/>
+              <a:t>。（有一个</a:t>
+            </a:r>
+            <a:r>
+              <a:rPr lang="en-US" altLang="zh-CN" dirty="0"/>
+              <a:t>Ryu app</a:t>
+            </a:r>
+            <a:r>
+              <a:rPr lang="zh-CN" altLang="en-US" dirty="0"/>
+              <a:t>运行</a:t>
+            </a:r>
+            <a:r>
+              <a:rPr lang="en-US" altLang="zh-CN" dirty="0" err="1"/>
+              <a:t>spt</a:t>
+            </a:r>
+            <a:r>
+              <a:rPr lang="zh-CN" altLang="en-US" dirty="0"/>
+              <a:t>协议）</a:t>
+            </a:r>
+            <a:endParaRPr lang="en-US" altLang="zh-CN" dirty="0"/>
+          </a:p>
+          <a:p>
+            <a:r>
+              <a:rPr lang="zh-CN" altLang="en-US" dirty="0"/>
+              <a:t>配置</a:t>
+            </a:r>
+            <a:r>
+              <a:rPr lang="en-US" altLang="zh-CN" dirty="0"/>
+              <a:t>L3</a:t>
+            </a:r>
+            <a:r>
+              <a:rPr lang="zh-CN" altLang="en-US" dirty="0"/>
+              <a:t>路由规则：</a:t>
+            </a:r>
+            <a:endParaRPr lang="en-US" altLang="zh-CN" dirty="0"/>
+          </a:p>
+          <a:p>
+            <a:r>
+              <a:rPr lang="en-US" altLang="zh-CN" dirty="0"/>
+              <a:t>	</a:t>
+            </a:r>
+            <a:r>
+              <a:rPr lang="zh-CN" altLang="en-US" dirty="0"/>
+              <a:t>如果</a:t>
+            </a:r>
+            <a:r>
+              <a:rPr lang="en-US" altLang="zh-CN" dirty="0" err="1"/>
+              <a:t>dst</a:t>
+            </a:r>
+            <a:r>
+              <a:rPr lang="en-US" altLang="zh-CN" dirty="0"/>
+              <a:t> mac</a:t>
+            </a:r>
+            <a:r>
+              <a:rPr lang="zh-CN" altLang="en-US" dirty="0"/>
+              <a:t>是这台</a:t>
+            </a:r>
+            <a:r>
+              <a:rPr lang="en-US" altLang="zh-CN" dirty="0"/>
+              <a:t>L3 switch </a:t>
+            </a:r>
+            <a:r>
+              <a:rPr lang="en-US" altLang="zh-CN" dirty="0" err="1"/>
+              <a:t>nic</a:t>
+            </a:r>
+            <a:r>
+              <a:rPr lang="en-US" altLang="zh-CN" dirty="0"/>
+              <a:t> mac</a:t>
+            </a:r>
+            <a:r>
+              <a:rPr lang="zh-CN" altLang="en-US" dirty="0"/>
+              <a:t>：把所有从</a:t>
+            </a:r>
+            <a:r>
+              <a:rPr lang="en-US" altLang="zh-CN" dirty="0"/>
+              <a:t>Inbound port</a:t>
+            </a:r>
+            <a:r>
+              <a:rPr lang="zh-CN" altLang="en-US" dirty="0"/>
+              <a:t>输入的</a:t>
+            </a:r>
+            <a:r>
+              <a:rPr lang="en-US" altLang="zh-CN" dirty="0"/>
+              <a:t>Inbound traffic</a:t>
+            </a:r>
+            <a:r>
+              <a:rPr lang="zh-CN" altLang="en-US" dirty="0"/>
+              <a:t>路由给</a:t>
+            </a:r>
+            <a:r>
+              <a:rPr lang="en-US" altLang="zh-CN" dirty="0"/>
+              <a:t>Classifier</a:t>
+            </a:r>
+            <a:r>
+              <a:rPr lang="zh-CN" altLang="en-US" dirty="0"/>
+              <a:t>（修改</a:t>
+            </a:r>
+            <a:r>
+              <a:rPr lang="en-US" altLang="zh-CN" dirty="0" err="1"/>
+              <a:t>src</a:t>
+            </a:r>
+            <a:r>
+              <a:rPr lang="en-US" altLang="zh-CN" dirty="0"/>
+              <a:t> mac to DCN Gateway</a:t>
+            </a:r>
+            <a:r>
+              <a:rPr lang="zh-CN" altLang="en-US" dirty="0"/>
+              <a:t>，</a:t>
+            </a:r>
+            <a:r>
+              <a:rPr lang="en-US" altLang="zh-CN" dirty="0" err="1"/>
+              <a:t>dst</a:t>
+            </a:r>
+            <a:r>
+              <a:rPr lang="en-US" altLang="zh-CN" dirty="0"/>
+              <a:t> mac to classifier</a:t>
+            </a:r>
+            <a:r>
+              <a:rPr lang="zh-CN" altLang="en-US" dirty="0"/>
+              <a:t>）；（有一个</a:t>
+            </a:r>
+            <a:r>
+              <a:rPr lang="en-US" altLang="zh-CN" dirty="0" err="1"/>
+              <a:t>ryu</a:t>
+            </a:r>
+            <a:r>
+              <a:rPr lang="en-US" altLang="zh-CN" dirty="0"/>
+              <a:t> app</a:t>
+            </a:r>
+            <a:r>
+              <a:rPr lang="zh-CN" altLang="en-US" dirty="0"/>
+              <a:t>运行静态规则下发）</a:t>
+            </a:r>
+            <a:endParaRPr lang="en-US" altLang="zh-CN" dirty="0"/>
+          </a:p>
+          <a:p>
+            <a:r>
+              <a:rPr lang="en-US" altLang="zh-CN" dirty="0"/>
+              <a:t>	</a:t>
+            </a:r>
+            <a:r>
+              <a:rPr lang="zh-CN" altLang="en-US" dirty="0"/>
+              <a:t>如果</a:t>
+            </a:r>
+            <a:r>
+              <a:rPr lang="en-US" altLang="zh-CN" dirty="0" err="1"/>
+              <a:t>dst</a:t>
+            </a:r>
+            <a:r>
+              <a:rPr lang="en-US" altLang="zh-CN" dirty="0"/>
+              <a:t> </a:t>
+            </a:r>
+            <a:r>
+              <a:rPr lang="en-US" altLang="zh-CN" dirty="0" err="1"/>
+              <a:t>ip</a:t>
+            </a:r>
+            <a:r>
+              <a:rPr lang="zh-CN" altLang="en-US" dirty="0"/>
+              <a:t>是外网的发给</a:t>
+            </a:r>
+            <a:r>
+              <a:rPr lang="en-US" altLang="zh-CN" dirty="0"/>
+              <a:t>Ingress</a:t>
+            </a:r>
+            <a:r>
+              <a:rPr lang="zh-CN" altLang="en-US" dirty="0"/>
+              <a:t>；（有一个</a:t>
+            </a:r>
+            <a:r>
+              <a:rPr lang="en-US" altLang="zh-CN" dirty="0"/>
+              <a:t>Ryu app</a:t>
+            </a:r>
+            <a:r>
+              <a:rPr lang="zh-CN" altLang="en-US" dirty="0"/>
+              <a:t>计算以</a:t>
+            </a:r>
+            <a:r>
+              <a:rPr lang="en-US" altLang="zh-CN" dirty="0"/>
+              <a:t>gateway1</a:t>
+            </a:r>
+            <a:r>
+              <a:rPr lang="zh-CN" altLang="en-US" dirty="0"/>
+              <a:t>或者</a:t>
+            </a:r>
+            <a:r>
+              <a:rPr lang="en-US" altLang="zh-CN" dirty="0"/>
+              <a:t>2</a:t>
+            </a:r>
+            <a:r>
+              <a:rPr lang="zh-CN" altLang="en-US" dirty="0"/>
+              <a:t>为</a:t>
+            </a:r>
+            <a:r>
+              <a:rPr lang="en-US" altLang="zh-CN" dirty="0"/>
+              <a:t>root</a:t>
+            </a:r>
+            <a:r>
+              <a:rPr lang="zh-CN" altLang="en-US" dirty="0"/>
+              <a:t>的转发树，发生</a:t>
+            </a:r>
+            <a:r>
+              <a:rPr lang="en-US" altLang="zh-CN" dirty="0"/>
+              <a:t>network</a:t>
+            </a:r>
+            <a:r>
+              <a:rPr lang="zh-CN" altLang="en-US" dirty="0"/>
+              <a:t>故障需要重新计算）</a:t>
+            </a:r>
+            <a:endParaRPr lang="en-US" altLang="zh-CN" dirty="0"/>
+          </a:p>
+          <a:p>
+            <a:r>
+              <a:rPr lang="en-US" altLang="zh-CN" dirty="0"/>
+              <a:t>	</a:t>
+            </a:r>
+            <a:r>
+              <a:rPr lang="zh-CN" altLang="en-US" dirty="0"/>
+              <a:t>如果</a:t>
+            </a:r>
+            <a:r>
+              <a:rPr lang="en-US" altLang="zh-CN" dirty="0" err="1"/>
+              <a:t>dst</a:t>
+            </a:r>
+            <a:r>
+              <a:rPr lang="en-US" altLang="zh-CN" dirty="0"/>
+              <a:t> </a:t>
+            </a:r>
+            <a:r>
+              <a:rPr lang="en-US" altLang="zh-CN" dirty="0" err="1"/>
+              <a:t>ip</a:t>
+            </a:r>
+            <a:r>
+              <a:rPr lang="zh-CN" altLang="en-US" dirty="0"/>
+              <a:t>是内网</a:t>
+            </a:r>
+            <a:r>
+              <a:rPr lang="en-US" altLang="zh-CN" dirty="0"/>
+              <a:t>192.168.121.0/24</a:t>
+            </a:r>
+            <a:r>
+              <a:rPr lang="zh-CN" altLang="en-US" dirty="0"/>
+              <a:t>的就丢弃（不负责</a:t>
+            </a:r>
+            <a:r>
+              <a:rPr lang="en-US" altLang="zh-CN" dirty="0"/>
+              <a:t>L2</a:t>
+            </a:r>
+            <a:r>
+              <a:rPr lang="zh-CN" altLang="en-US" dirty="0"/>
+              <a:t>转发）；</a:t>
+            </a:r>
+            <a:endParaRPr lang="en-US" altLang="zh-CN" dirty="0"/>
+          </a:p>
+          <a:p>
+            <a:r>
+              <a:rPr lang="en-US" altLang="zh-CN" dirty="0"/>
+              <a:t>	</a:t>
+            </a:r>
+            <a:r>
+              <a:rPr lang="zh-CN" altLang="en-US" dirty="0"/>
+              <a:t>如果</a:t>
+            </a:r>
+            <a:r>
+              <a:rPr lang="en-US" altLang="zh-CN" dirty="0" err="1"/>
+              <a:t>dst</a:t>
+            </a:r>
+            <a:r>
+              <a:rPr lang="en-US" altLang="zh-CN" dirty="0"/>
+              <a:t> </a:t>
+            </a:r>
+            <a:r>
+              <a:rPr lang="en-US" altLang="zh-CN" dirty="0" err="1"/>
+              <a:t>ip</a:t>
+            </a:r>
+            <a:r>
+              <a:rPr lang="zh-CN" altLang="en-US" dirty="0"/>
+              <a:t>是内网</a:t>
+            </a:r>
+            <a:r>
+              <a:rPr lang="en-US" altLang="zh-CN" dirty="0"/>
+              <a:t>10.0.0.0/8</a:t>
+            </a:r>
+            <a:r>
+              <a:rPr lang="zh-CN" altLang="en-US" dirty="0"/>
+              <a:t>的按照</a:t>
+            </a:r>
+            <a:r>
+              <a:rPr lang="en-US" altLang="zh-CN" dirty="0"/>
+              <a:t>SFC domain</a:t>
+            </a:r>
+            <a:r>
+              <a:rPr lang="zh-CN" altLang="en-US" dirty="0"/>
+              <a:t>流表转发；（有一个</a:t>
+            </a:r>
+            <a:r>
+              <a:rPr lang="en-US" altLang="zh-CN" dirty="0"/>
+              <a:t>Ryu app</a:t>
+            </a:r>
+            <a:r>
+              <a:rPr lang="zh-CN" altLang="en-US" dirty="0"/>
+              <a:t>计算</a:t>
+            </a:r>
+            <a:r>
+              <a:rPr lang="en-US" altLang="zh-CN" dirty="0"/>
+              <a:t>UFFR</a:t>
+            </a:r>
+            <a:r>
+              <a:rPr lang="zh-CN" altLang="en-US" dirty="0"/>
+              <a:t>路径，这个是唯一需要和</a:t>
+            </a:r>
+            <a:r>
+              <a:rPr lang="en-US" altLang="zh-CN" dirty="0"/>
+              <a:t>orchestrator</a:t>
+            </a:r>
+            <a:r>
+              <a:rPr lang="zh-CN" altLang="en-US" dirty="0"/>
+              <a:t>交互的</a:t>
+            </a:r>
+            <a:r>
+              <a:rPr lang="en-US" altLang="zh-CN" dirty="0"/>
+              <a:t>app</a:t>
+            </a:r>
+            <a:r>
+              <a:rPr lang="zh-CN" altLang="en-US" dirty="0"/>
+              <a:t>）</a:t>
+            </a:r>
+            <a:endParaRPr lang="en-US" altLang="zh-CN" dirty="0"/>
+          </a:p>
+          <a:p>
+            <a:endParaRPr lang="en-US" altLang="zh-CN" dirty="0"/>
+          </a:p>
+          <a:p>
+            <a:r>
+              <a:rPr lang="en-US" altLang="zh-CN" dirty="0"/>
+              <a:t>Classifier</a:t>
+            </a:r>
+            <a:r>
+              <a:rPr lang="zh-CN" altLang="en-US" dirty="0"/>
+              <a:t>（无状态）执行流分类（</a:t>
+            </a:r>
+            <a:r>
+              <a:rPr lang="en-US" altLang="zh-CN" dirty="0"/>
+              <a:t>match </a:t>
+            </a:r>
+            <a:r>
+              <a:rPr lang="en-US" altLang="zh-CN" dirty="0" err="1"/>
+              <a:t>src</a:t>
+            </a:r>
+            <a:r>
+              <a:rPr lang="en-US" altLang="zh-CN" dirty="0"/>
+              <a:t>/</a:t>
+            </a:r>
+            <a:r>
+              <a:rPr lang="en-US" altLang="zh-CN" dirty="0" err="1"/>
+              <a:t>dst</a:t>
+            </a:r>
+            <a:r>
+              <a:rPr lang="en-US" altLang="zh-CN" dirty="0"/>
+              <a:t> </a:t>
+            </a:r>
+            <a:r>
+              <a:rPr lang="en-US" altLang="zh-CN" dirty="0" err="1"/>
+              <a:t>ip</a:t>
+            </a:r>
+            <a:r>
+              <a:rPr lang="zh-CN" altLang="en-US" dirty="0"/>
+              <a:t>）</a:t>
+            </a:r>
+            <a:endParaRPr lang="en-US" altLang="zh-CN" dirty="0"/>
+          </a:p>
+          <a:p>
+            <a:r>
+              <a:rPr lang="zh-CN" altLang="en-US" dirty="0"/>
+              <a:t>对于正向</a:t>
+            </a:r>
+            <a:r>
+              <a:rPr lang="en-US" altLang="zh-CN" dirty="0"/>
+              <a:t>SFC</a:t>
+            </a:r>
+            <a:r>
+              <a:rPr lang="zh-CN" altLang="en-US" dirty="0"/>
+              <a:t>流（匹配</a:t>
+            </a:r>
+            <a:r>
+              <a:rPr lang="en-US" altLang="zh-CN" dirty="0" err="1"/>
+              <a:t>dst</a:t>
+            </a:r>
+            <a:r>
+              <a:rPr lang="en-US" altLang="zh-CN" dirty="0"/>
+              <a:t> </a:t>
+            </a:r>
+            <a:r>
+              <a:rPr lang="en-US" altLang="zh-CN" dirty="0" err="1"/>
+              <a:t>ip</a:t>
+            </a:r>
+            <a:r>
+              <a:rPr lang="zh-CN" altLang="en-US" dirty="0"/>
+              <a:t>）：</a:t>
+            </a:r>
+            <a:endParaRPr lang="en-US" altLang="zh-CN" dirty="0"/>
+          </a:p>
+          <a:p>
+            <a:r>
+              <a:rPr lang="en-US" altLang="zh-CN" dirty="0" err="1"/>
+              <a:t>Decap</a:t>
+            </a:r>
+            <a:r>
+              <a:rPr lang="en-US" altLang="zh-CN" dirty="0"/>
+              <a:t> mac header</a:t>
+            </a:r>
+            <a:r>
+              <a:rPr lang="zh-CN" altLang="en-US" dirty="0"/>
+              <a:t>；</a:t>
+            </a:r>
+            <a:endParaRPr lang="en-US" altLang="zh-CN" dirty="0"/>
+          </a:p>
+          <a:p>
+            <a:r>
+              <a:rPr lang="en-US" altLang="zh-CN" dirty="0" err="1"/>
+              <a:t>Encap</a:t>
+            </a:r>
+            <a:r>
+              <a:rPr lang="en-US" altLang="zh-CN" dirty="0"/>
+              <a:t> </a:t>
+            </a:r>
+            <a:r>
+              <a:rPr lang="en-US" altLang="zh-CN" dirty="0" err="1"/>
+              <a:t>outter</a:t>
+            </a:r>
+            <a:r>
+              <a:rPr lang="en-US" altLang="zh-CN" dirty="0"/>
+              <a:t> </a:t>
+            </a:r>
+            <a:r>
+              <a:rPr lang="en-US" altLang="zh-CN" dirty="0" err="1"/>
+              <a:t>ip</a:t>
+            </a:r>
+            <a:r>
+              <a:rPr lang="en-US" altLang="zh-CN" dirty="0"/>
+              <a:t> header</a:t>
+            </a:r>
+            <a:r>
+              <a:rPr lang="zh-CN" altLang="en-US" dirty="0"/>
+              <a:t>到下一个</a:t>
+            </a:r>
+            <a:r>
+              <a:rPr lang="en-US" altLang="zh-CN" dirty="0"/>
+              <a:t>VNF</a:t>
+            </a:r>
+            <a:r>
+              <a:rPr lang="zh-CN" altLang="en-US" dirty="0"/>
+              <a:t>所在</a:t>
+            </a:r>
+            <a:r>
+              <a:rPr lang="en-US" altLang="zh-CN" dirty="0"/>
+              <a:t>server</a:t>
+            </a:r>
+            <a:r>
+              <a:rPr lang="zh-CN" altLang="en-US" dirty="0"/>
+              <a:t>，</a:t>
+            </a:r>
+            <a:r>
+              <a:rPr lang="en-US" altLang="zh-CN" dirty="0" err="1"/>
+              <a:t>src</a:t>
+            </a:r>
+            <a:r>
+              <a:rPr lang="en-US" altLang="zh-CN" dirty="0"/>
+              <a:t> </a:t>
+            </a:r>
+            <a:r>
+              <a:rPr lang="en-US" altLang="zh-CN" dirty="0" err="1"/>
+              <a:t>ip</a:t>
+            </a:r>
+            <a:r>
+              <a:rPr lang="en-US" altLang="zh-CN" dirty="0"/>
+              <a:t>=Classifier</a:t>
+            </a:r>
+            <a:r>
+              <a:rPr lang="zh-CN" altLang="en-US" dirty="0"/>
+              <a:t>， </a:t>
+            </a:r>
+            <a:r>
+              <a:rPr lang="en-US" altLang="zh-CN" dirty="0" err="1"/>
+              <a:t>dst</a:t>
+            </a:r>
+            <a:r>
+              <a:rPr lang="en-US" altLang="zh-CN" dirty="0"/>
+              <a:t> </a:t>
+            </a:r>
+            <a:r>
+              <a:rPr lang="en-US" altLang="zh-CN" dirty="0" err="1"/>
+              <a:t>ip</a:t>
+            </a:r>
+            <a:r>
+              <a:rPr lang="en-US" altLang="zh-CN" dirty="0"/>
+              <a:t>=</a:t>
+            </a:r>
+            <a:r>
+              <a:rPr lang="en-US" altLang="zh-CN" dirty="0" err="1"/>
+              <a:t>nextServerSFCDomainIP</a:t>
+            </a:r>
+            <a:endParaRPr lang="en-US" altLang="zh-CN" dirty="0"/>
+          </a:p>
+          <a:p>
+            <a:r>
+              <a:rPr lang="en-US" altLang="zh-CN" dirty="0" err="1"/>
+              <a:t>Encap</a:t>
+            </a:r>
+            <a:r>
+              <a:rPr lang="en-US" altLang="zh-CN" dirty="0"/>
+              <a:t> mac header</a:t>
+            </a:r>
+            <a:r>
+              <a:rPr lang="zh-CN" altLang="en-US" dirty="0"/>
+              <a:t>（</a:t>
+            </a:r>
+            <a:r>
+              <a:rPr lang="en-US" altLang="zh-CN" dirty="0" err="1"/>
+              <a:t>src</a:t>
+            </a:r>
+            <a:r>
+              <a:rPr lang="en-US" altLang="zh-CN" dirty="0"/>
+              <a:t> mac=classifier mac</a:t>
+            </a:r>
+            <a:r>
+              <a:rPr lang="zh-CN" altLang="en-US" dirty="0"/>
+              <a:t>；</a:t>
+            </a:r>
+            <a:r>
+              <a:rPr lang="en-US" altLang="zh-CN" dirty="0" err="1"/>
+              <a:t>dst</a:t>
+            </a:r>
+            <a:r>
+              <a:rPr lang="en-US" altLang="zh-CN" dirty="0"/>
+              <a:t> mac=DCN Gateway mac</a:t>
+            </a:r>
+            <a:r>
+              <a:rPr lang="zh-CN" altLang="en-US" dirty="0"/>
+              <a:t>）</a:t>
+            </a:r>
+            <a:endParaRPr lang="en-US" altLang="zh-CN" dirty="0"/>
+          </a:p>
+          <a:p>
+            <a:r>
+              <a:rPr lang="zh-CN" altLang="en-US" dirty="0"/>
+              <a:t>至此</a:t>
+            </a:r>
+            <a:r>
+              <a:rPr lang="en-US" altLang="zh-CN" dirty="0"/>
+              <a:t>inbound traffic</a:t>
+            </a:r>
+            <a:r>
+              <a:rPr lang="zh-CN" altLang="en-US" dirty="0"/>
+              <a:t>进入</a:t>
+            </a:r>
+            <a:r>
+              <a:rPr lang="en-US" altLang="zh-CN" dirty="0"/>
+              <a:t>SFC domain</a:t>
+            </a:r>
+          </a:p>
+          <a:p>
+            <a:endParaRPr lang="en-US" altLang="zh-CN" dirty="0"/>
+          </a:p>
+          <a:p>
+            <a:r>
+              <a:rPr lang="en-US" altLang="zh-CN" dirty="0"/>
+              <a:t>SFC</a:t>
+            </a:r>
+            <a:r>
+              <a:rPr lang="zh-CN" altLang="en-US" dirty="0"/>
+              <a:t>：</a:t>
+            </a:r>
+            <a:r>
+              <a:rPr lang="en-US" altLang="zh-CN" dirty="0"/>
+              <a:t>FW-&gt;LB</a:t>
+            </a:r>
+          </a:p>
+          <a:p>
+            <a:r>
+              <a:rPr lang="en-US" altLang="zh-CN" dirty="0"/>
+              <a:t>FW</a:t>
+            </a:r>
+            <a:r>
+              <a:rPr lang="zh-CN" altLang="en-US" dirty="0"/>
+              <a:t>：</a:t>
+            </a:r>
+            <a:r>
+              <a:rPr lang="en-US" altLang="zh-CN" dirty="0"/>
+              <a:t>drop or pass</a:t>
+            </a:r>
+          </a:p>
+          <a:p>
+            <a:r>
+              <a:rPr lang="en-US" altLang="zh-CN" dirty="0"/>
+              <a:t>LB</a:t>
+            </a:r>
+            <a:r>
+              <a:rPr lang="zh-CN" altLang="en-US" dirty="0"/>
+              <a:t>：修改</a:t>
+            </a:r>
+            <a:r>
+              <a:rPr lang="en-US" altLang="zh-CN" dirty="0"/>
+              <a:t>inner </a:t>
+            </a:r>
+            <a:r>
+              <a:rPr lang="en-US" altLang="zh-CN" dirty="0" err="1"/>
+              <a:t>dst</a:t>
+            </a:r>
+            <a:r>
+              <a:rPr lang="en-US" altLang="zh-CN" dirty="0"/>
+              <a:t> </a:t>
+            </a:r>
+            <a:r>
+              <a:rPr lang="en-US" altLang="zh-CN" dirty="0" err="1"/>
+              <a:t>ip</a:t>
+            </a:r>
+            <a:r>
+              <a:rPr lang="zh-CN" altLang="en-US" dirty="0"/>
+              <a:t>为</a:t>
+            </a:r>
+            <a:r>
+              <a:rPr lang="en-US" altLang="zh-CN" dirty="0"/>
+              <a:t>website server</a:t>
+            </a:r>
+            <a:r>
+              <a:rPr lang="zh-CN" altLang="en-US" dirty="0"/>
+              <a:t>中的一台（内网</a:t>
+            </a:r>
+            <a:r>
+              <a:rPr lang="en-US" altLang="zh-CN" dirty="0" err="1"/>
+              <a:t>ip</a:t>
+            </a:r>
+            <a:r>
+              <a:rPr lang="zh-CN" altLang="en-US" dirty="0"/>
+              <a:t>）</a:t>
+            </a:r>
+            <a:endParaRPr lang="en-US" altLang="zh-CN" dirty="0"/>
+          </a:p>
+          <a:p>
+            <a:endParaRPr lang="en-US" altLang="zh-CN" dirty="0"/>
+          </a:p>
+          <a:p>
+            <a:pPr marL="0" marR="0" lvl="0" indent="0" algn="l" defTabSz="914400" rtl="0" eaLnBrk="1" fontAlgn="auto" latinLnBrk="0" hangingPunct="1">
+              <a:lnSpc>
+                <a:spcPct val="100000"/>
+              </a:lnSpc>
+              <a:spcBef>
+                <a:spcPts val="0"/>
+              </a:spcBef>
+              <a:spcAft>
+                <a:spcPts val="0"/>
+              </a:spcAft>
+              <a:buClrTx/>
+              <a:buSzTx/>
+              <a:buFontTx/>
+              <a:buNone/>
+              <a:tabLst/>
+              <a:defRPr/>
+            </a:pPr>
+            <a:r>
+              <a:rPr lang="zh-CN" altLang="en-US" dirty="0"/>
+              <a:t>每台</a:t>
+            </a:r>
+            <a:r>
+              <a:rPr lang="en-US" altLang="zh-CN" dirty="0"/>
+              <a:t>VNF server</a:t>
+            </a:r>
+            <a:r>
+              <a:rPr lang="zh-CN" altLang="en-US" dirty="0"/>
+              <a:t>的</a:t>
+            </a:r>
+            <a:r>
+              <a:rPr lang="en-US" altLang="zh-CN" dirty="0"/>
+              <a:t>BESS</a:t>
+            </a:r>
+            <a:r>
+              <a:rPr lang="zh-CN" altLang="en-US" dirty="0"/>
+              <a:t>需要配置默认的</a:t>
+            </a:r>
+            <a:r>
+              <a:rPr lang="en-US" altLang="zh-CN" dirty="0"/>
+              <a:t>gateway</a:t>
+            </a:r>
+            <a:r>
+              <a:rPr lang="zh-CN" altLang="en-US" dirty="0"/>
+              <a:t>为</a:t>
+            </a:r>
+            <a:r>
+              <a:rPr lang="en-US" altLang="zh-CN" dirty="0"/>
+              <a:t>peer </a:t>
+            </a:r>
+            <a:r>
+              <a:rPr lang="en-US" altLang="zh-CN" dirty="0" err="1"/>
+              <a:t>ovs</a:t>
+            </a:r>
+            <a:r>
+              <a:rPr lang="zh-CN" altLang="en-US" dirty="0"/>
+              <a:t>。这个需要控制平面收集信息，并配置</a:t>
+            </a:r>
+            <a:r>
+              <a:rPr lang="en-US" altLang="zh-CN" dirty="0"/>
+              <a:t>BESS</a:t>
+            </a:r>
+            <a:r>
+              <a:rPr lang="zh-CN" altLang="en-US" dirty="0"/>
+              <a:t>来实现这一功能。</a:t>
+            </a:r>
+            <a:endParaRPr lang="en-US" altLang="zh-CN" dirty="0"/>
+          </a:p>
+          <a:p>
+            <a:pPr marL="0" marR="0" lvl="0" indent="0" algn="l" defTabSz="914400" rtl="0" eaLnBrk="1" fontAlgn="auto" latinLnBrk="0" hangingPunct="1">
+              <a:lnSpc>
+                <a:spcPct val="100000"/>
+              </a:lnSpc>
+              <a:spcBef>
+                <a:spcPts val="0"/>
+              </a:spcBef>
+              <a:spcAft>
+                <a:spcPts val="0"/>
+              </a:spcAft>
+              <a:buClrTx/>
+              <a:buSzTx/>
+              <a:buFontTx/>
+              <a:buNone/>
+              <a:tabLst/>
+              <a:defRPr/>
+            </a:pPr>
+            <a:r>
+              <a:rPr lang="zh-CN" altLang="en-US" dirty="0"/>
+              <a:t>每个</a:t>
+            </a:r>
+            <a:r>
+              <a:rPr lang="en-US" altLang="zh-CN" dirty="0"/>
+              <a:t>SFF</a:t>
+            </a:r>
+            <a:r>
+              <a:rPr lang="zh-CN" altLang="en-US" dirty="0"/>
+              <a:t>收到</a:t>
+            </a:r>
+            <a:r>
+              <a:rPr lang="en-US" altLang="zh-CN" dirty="0"/>
+              <a:t>frame</a:t>
+            </a:r>
+            <a:r>
+              <a:rPr lang="zh-CN" altLang="en-US" dirty="0"/>
+              <a:t>不要去掉</a:t>
+            </a:r>
+            <a:r>
+              <a:rPr lang="en-US" altLang="zh-CN" dirty="0"/>
+              <a:t>mac header</a:t>
+            </a:r>
+            <a:r>
+              <a:rPr lang="zh-CN" altLang="en-US" dirty="0"/>
+              <a:t>；</a:t>
+            </a:r>
+            <a:r>
+              <a:rPr lang="en-US" altLang="zh-CN" dirty="0"/>
+              <a:t>traffic</a:t>
+            </a:r>
+            <a:r>
+              <a:rPr lang="zh-CN" altLang="en-US" dirty="0"/>
+              <a:t>从</a:t>
+            </a:r>
+            <a:r>
+              <a:rPr lang="en-US" altLang="zh-CN" dirty="0"/>
+              <a:t>server</a:t>
+            </a:r>
+            <a:r>
+              <a:rPr lang="zh-CN" altLang="en-US" dirty="0"/>
+              <a:t>发出去时，修改</a:t>
+            </a:r>
+            <a:r>
+              <a:rPr lang="en-US" altLang="zh-CN" dirty="0" err="1"/>
+              <a:t>outter</a:t>
+            </a:r>
+            <a:r>
+              <a:rPr lang="en-US" altLang="zh-CN" dirty="0"/>
+              <a:t> mac header</a:t>
+            </a:r>
+            <a:r>
+              <a:rPr lang="zh-CN" altLang="en-US" dirty="0"/>
+              <a:t>：</a:t>
+            </a:r>
+            <a:r>
+              <a:rPr lang="en-US" altLang="zh-CN" dirty="0" err="1"/>
+              <a:t>src</a:t>
+            </a:r>
+            <a:r>
+              <a:rPr lang="en-US" altLang="zh-CN" dirty="0"/>
+              <a:t> mac=server mac</a:t>
+            </a:r>
+            <a:r>
+              <a:rPr lang="zh-CN" altLang="en-US" dirty="0"/>
+              <a:t>；</a:t>
+            </a:r>
+            <a:r>
+              <a:rPr lang="en-US" altLang="zh-CN" dirty="0" err="1"/>
+              <a:t>dst</a:t>
+            </a:r>
+            <a:r>
+              <a:rPr lang="en-US" altLang="zh-CN" dirty="0"/>
+              <a:t> mac=</a:t>
+            </a:r>
+            <a:r>
+              <a:rPr lang="en-US" altLang="zh-CN" dirty="0" err="1"/>
+              <a:t>ovs</a:t>
+            </a:r>
+            <a:r>
+              <a:rPr lang="en-US" altLang="zh-CN" dirty="0"/>
+              <a:t> mac</a:t>
+            </a:r>
+            <a:r>
+              <a:rPr lang="zh-CN" altLang="en-US" dirty="0"/>
+              <a:t>。</a:t>
+            </a:r>
+            <a:endParaRPr lang="en-US" altLang="zh-CN" dirty="0"/>
+          </a:p>
+          <a:p>
+            <a:r>
+              <a:rPr lang="zh-CN" altLang="en-US" dirty="0"/>
+              <a:t>第一个</a:t>
+            </a:r>
+            <a:r>
+              <a:rPr lang="en-US" altLang="zh-CN" dirty="0"/>
+              <a:t>SFF</a:t>
+            </a:r>
+            <a:r>
+              <a:rPr lang="zh-CN" altLang="en-US" dirty="0"/>
+              <a:t>在</a:t>
+            </a:r>
+            <a:r>
+              <a:rPr lang="en-US" altLang="zh-CN" dirty="0"/>
+              <a:t>VNF</a:t>
+            </a:r>
+            <a:r>
+              <a:rPr lang="zh-CN" altLang="en-US" dirty="0"/>
+              <a:t>处理完</a:t>
+            </a:r>
+            <a:r>
+              <a:rPr lang="en-US" altLang="zh-CN" dirty="0"/>
+              <a:t>traffic</a:t>
+            </a:r>
+            <a:r>
+              <a:rPr lang="zh-CN" altLang="en-US" dirty="0"/>
+              <a:t>后更新</a:t>
+            </a:r>
+            <a:r>
+              <a:rPr lang="en-US" altLang="zh-CN" dirty="0" err="1"/>
+              <a:t>outter</a:t>
+            </a:r>
+            <a:r>
+              <a:rPr lang="en-US" altLang="zh-CN" dirty="0"/>
+              <a:t> </a:t>
+            </a:r>
+            <a:r>
+              <a:rPr lang="en-US" altLang="zh-CN" dirty="0" err="1"/>
+              <a:t>ip</a:t>
+            </a:r>
+            <a:r>
+              <a:rPr lang="en-US" altLang="zh-CN" dirty="0"/>
+              <a:t> header</a:t>
+            </a:r>
+            <a:r>
+              <a:rPr lang="zh-CN" altLang="en-US" dirty="0"/>
+              <a:t>（只更新</a:t>
+            </a:r>
+            <a:r>
+              <a:rPr lang="en-US" altLang="zh-CN" dirty="0" err="1"/>
+              <a:t>dst</a:t>
+            </a:r>
+            <a:r>
+              <a:rPr lang="en-US" altLang="zh-CN" dirty="0"/>
+              <a:t> </a:t>
+            </a:r>
+            <a:r>
+              <a:rPr lang="en-US" altLang="zh-CN" dirty="0" err="1"/>
+              <a:t>ip</a:t>
+            </a:r>
+            <a:r>
+              <a:rPr lang="zh-CN" altLang="en-US" dirty="0"/>
+              <a:t>；</a:t>
+            </a:r>
+            <a:r>
+              <a:rPr lang="en-US" altLang="zh-CN" dirty="0" err="1"/>
+              <a:t>src</a:t>
+            </a:r>
+            <a:r>
+              <a:rPr lang="en-US" altLang="zh-CN" dirty="0"/>
+              <a:t> </a:t>
+            </a:r>
+            <a:r>
+              <a:rPr lang="en-US" altLang="zh-CN" dirty="0" err="1"/>
+              <a:t>ip</a:t>
+            </a:r>
+            <a:r>
+              <a:rPr lang="en-US" altLang="zh-CN" dirty="0"/>
+              <a:t>=classifier </a:t>
+            </a:r>
+            <a:r>
+              <a:rPr lang="en-US" altLang="zh-CN" dirty="0" err="1"/>
+              <a:t>ip</a:t>
+            </a:r>
+            <a:r>
+              <a:rPr lang="zh-CN" altLang="en-US" dirty="0"/>
+              <a:t>不变）；</a:t>
+            </a:r>
+            <a:endParaRPr lang="en-US" altLang="zh-CN" dirty="0"/>
+          </a:p>
+          <a:p>
+            <a:r>
+              <a:rPr lang="zh-CN" altLang="en-US" dirty="0"/>
+              <a:t>最后一个</a:t>
+            </a:r>
+            <a:r>
+              <a:rPr lang="en-US" altLang="zh-CN" dirty="0"/>
+              <a:t>SFF</a:t>
+            </a:r>
+            <a:r>
+              <a:rPr lang="zh-CN" altLang="en-US" dirty="0"/>
+              <a:t>解封</a:t>
+            </a:r>
+            <a:r>
+              <a:rPr lang="en-US" altLang="zh-CN" dirty="0" err="1"/>
+              <a:t>outter</a:t>
+            </a:r>
+            <a:r>
+              <a:rPr lang="en-US" altLang="zh-CN" dirty="0"/>
+              <a:t> </a:t>
+            </a:r>
+            <a:r>
+              <a:rPr lang="en-US" altLang="zh-CN" dirty="0" err="1"/>
+              <a:t>ip</a:t>
+            </a:r>
+            <a:r>
+              <a:rPr lang="en-US" altLang="zh-CN" dirty="0"/>
+              <a:t> header</a:t>
+            </a:r>
+            <a:r>
+              <a:rPr lang="zh-CN" altLang="en-US" dirty="0"/>
+              <a:t>，离开</a:t>
+            </a:r>
+            <a:r>
+              <a:rPr lang="en-US" altLang="zh-CN" dirty="0"/>
+              <a:t>SFC Domain</a:t>
+            </a:r>
+            <a:r>
+              <a:rPr lang="zh-CN" altLang="en-US" dirty="0"/>
+              <a:t>，进入</a:t>
+            </a:r>
+            <a:r>
+              <a:rPr lang="en-US" altLang="zh-CN" dirty="0"/>
+              <a:t>L2</a:t>
+            </a:r>
+            <a:r>
+              <a:rPr lang="zh-CN" altLang="en-US" dirty="0"/>
+              <a:t>转发。</a:t>
+            </a:r>
+            <a:endParaRPr lang="en-US" altLang="zh-CN" dirty="0"/>
+          </a:p>
+          <a:p>
+            <a:r>
+              <a:rPr lang="en-US" altLang="zh-CN" dirty="0" err="1"/>
+              <a:t>src</a:t>
+            </a:r>
+            <a:r>
+              <a:rPr lang="en-US" altLang="zh-CN" dirty="0"/>
+              <a:t> mac=classifier mac</a:t>
+            </a:r>
+            <a:r>
+              <a:rPr lang="zh-CN" altLang="en-US" dirty="0"/>
+              <a:t>（伪造</a:t>
+            </a:r>
+            <a:r>
+              <a:rPr lang="en-US" altLang="zh-CN" dirty="0" err="1"/>
+              <a:t>src</a:t>
+            </a:r>
+            <a:r>
+              <a:rPr lang="en-US" altLang="zh-CN" dirty="0"/>
+              <a:t> mac</a:t>
+            </a:r>
+            <a:r>
+              <a:rPr lang="zh-CN" altLang="en-US" dirty="0"/>
+              <a:t>，这步很重要，因为只有这样才能保证</a:t>
+            </a:r>
+            <a:r>
+              <a:rPr lang="en-US" altLang="zh-CN" dirty="0"/>
+              <a:t>website server</a:t>
+            </a:r>
+            <a:r>
+              <a:rPr lang="zh-CN" altLang="en-US" dirty="0"/>
+              <a:t>把</a:t>
+            </a:r>
+            <a:r>
+              <a:rPr lang="en-US" altLang="zh-CN" dirty="0"/>
+              <a:t>traffic</a:t>
+            </a:r>
+            <a:r>
+              <a:rPr lang="zh-CN" altLang="en-US" dirty="0"/>
+              <a:t>发回</a:t>
+            </a:r>
+            <a:r>
+              <a:rPr lang="en-US" altLang="zh-CN" dirty="0"/>
+              <a:t>classifier</a:t>
+            </a:r>
+            <a:r>
+              <a:rPr lang="zh-CN" altLang="en-US" dirty="0"/>
+              <a:t>）</a:t>
+            </a:r>
+            <a:endParaRPr lang="en-US" altLang="zh-CN" dirty="0"/>
+          </a:p>
+          <a:p>
+            <a:r>
+              <a:rPr lang="en-US" altLang="zh-CN" dirty="0" err="1"/>
+              <a:t>dst</a:t>
+            </a:r>
+            <a:r>
+              <a:rPr lang="en-US" altLang="zh-CN" dirty="0"/>
+              <a:t> mac=</a:t>
+            </a:r>
+            <a:r>
+              <a:rPr lang="zh-CN" altLang="en-US" dirty="0"/>
+              <a:t>根据情况</a:t>
+            </a:r>
+            <a:endParaRPr lang="en-US" altLang="zh-CN" dirty="0"/>
+          </a:p>
+          <a:p>
+            <a:pPr marL="0" marR="0" lvl="0" indent="0" algn="l" defTabSz="914400" rtl="0" eaLnBrk="1" fontAlgn="auto" latinLnBrk="0" hangingPunct="1">
+              <a:lnSpc>
+                <a:spcPct val="100000"/>
+              </a:lnSpc>
+              <a:spcBef>
+                <a:spcPts val="0"/>
+              </a:spcBef>
+              <a:spcAft>
+                <a:spcPts val="0"/>
+              </a:spcAft>
+              <a:buClrTx/>
+              <a:buSzTx/>
+              <a:buFontTx/>
+              <a:buNone/>
+              <a:tabLst/>
+              <a:defRPr/>
+            </a:pPr>
+            <a:r>
+              <a:rPr lang="en-US" altLang="zh-CN" dirty="0" err="1"/>
+              <a:t>src</a:t>
+            </a:r>
+            <a:r>
+              <a:rPr lang="en-US" altLang="zh-CN" dirty="0"/>
+              <a:t> </a:t>
+            </a:r>
+            <a:r>
+              <a:rPr lang="en-US" altLang="zh-CN" dirty="0" err="1"/>
+              <a:t>ip</a:t>
+            </a:r>
+            <a:r>
+              <a:rPr lang="en-US" altLang="zh-CN" dirty="0"/>
+              <a:t>=</a:t>
+            </a:r>
+            <a:r>
+              <a:rPr lang="zh-CN" altLang="en-US" dirty="0"/>
+              <a:t>？（不变或者被</a:t>
+            </a:r>
+            <a:r>
+              <a:rPr lang="en-US" altLang="zh-CN" dirty="0"/>
+              <a:t>VNF</a:t>
+            </a:r>
+            <a:r>
+              <a:rPr lang="zh-CN" altLang="en-US" dirty="0"/>
+              <a:t>处理过）</a:t>
+            </a:r>
+            <a:endParaRPr lang="en-US" altLang="zh-CN" dirty="0"/>
+          </a:p>
+          <a:p>
+            <a:r>
+              <a:rPr lang="en-US" altLang="zh-CN" dirty="0" err="1"/>
+              <a:t>dst</a:t>
+            </a:r>
+            <a:r>
+              <a:rPr lang="en-US" altLang="zh-CN" dirty="0"/>
+              <a:t> </a:t>
+            </a:r>
+            <a:r>
+              <a:rPr lang="en-US" altLang="zh-CN" dirty="0" err="1"/>
+              <a:t>ip</a:t>
+            </a:r>
+            <a:r>
+              <a:rPr lang="en-US" altLang="zh-CN" dirty="0"/>
+              <a:t>=</a:t>
+            </a:r>
+            <a:r>
+              <a:rPr lang="zh-CN" altLang="en-US" dirty="0"/>
+              <a:t>？（不变或者被</a:t>
+            </a:r>
+            <a:r>
+              <a:rPr lang="en-US" altLang="zh-CN" dirty="0"/>
+              <a:t>VNF</a:t>
+            </a:r>
+            <a:r>
+              <a:rPr lang="zh-CN" altLang="en-US" dirty="0"/>
+              <a:t>处理过）</a:t>
+            </a:r>
+            <a:endParaRPr lang="en-US" altLang="zh-CN" dirty="0"/>
+          </a:p>
+          <a:p>
+            <a:endParaRPr lang="en-US" altLang="zh-CN" dirty="0"/>
+          </a:p>
+          <a:p>
+            <a:r>
+              <a:rPr lang="en-US" altLang="zh-CN" dirty="0"/>
+              <a:t>Website server</a:t>
+            </a:r>
+            <a:r>
+              <a:rPr lang="zh-CN" altLang="en-US" dirty="0"/>
+              <a:t>收到</a:t>
+            </a:r>
+            <a:r>
+              <a:rPr lang="en-US" altLang="zh-CN" dirty="0"/>
+              <a:t>inbound traffic</a:t>
+            </a:r>
+            <a:r>
+              <a:rPr lang="zh-CN" altLang="en-US" dirty="0"/>
+              <a:t>，处理完毕，交换</a:t>
+            </a:r>
+            <a:r>
+              <a:rPr lang="en-US" altLang="zh-CN" dirty="0" err="1"/>
+              <a:t>dst</a:t>
+            </a:r>
+            <a:r>
+              <a:rPr lang="en-US" altLang="zh-CN" dirty="0"/>
+              <a:t>/</a:t>
+            </a:r>
+            <a:r>
+              <a:rPr lang="en-US" altLang="zh-CN" dirty="0" err="1"/>
+              <a:t>src</a:t>
+            </a:r>
+            <a:r>
+              <a:rPr lang="en-US" altLang="zh-CN" dirty="0"/>
+              <a:t> port</a:t>
+            </a:r>
+            <a:r>
+              <a:rPr lang="zh-CN" altLang="en-US" dirty="0"/>
+              <a:t>，交换</a:t>
+            </a:r>
+            <a:r>
+              <a:rPr lang="en-US" altLang="zh-CN" dirty="0" err="1"/>
+              <a:t>dst</a:t>
+            </a:r>
+            <a:r>
+              <a:rPr lang="en-US" altLang="zh-CN" dirty="0"/>
+              <a:t>/</a:t>
+            </a:r>
+            <a:r>
+              <a:rPr lang="en-US" altLang="zh-CN" dirty="0" err="1"/>
+              <a:t>src</a:t>
+            </a:r>
+            <a:r>
+              <a:rPr lang="en-US" altLang="zh-CN" dirty="0"/>
+              <a:t> </a:t>
+            </a:r>
+            <a:r>
+              <a:rPr lang="en-US" altLang="zh-CN" dirty="0" err="1"/>
+              <a:t>ip</a:t>
+            </a:r>
+            <a:r>
+              <a:rPr lang="zh-CN" altLang="en-US" dirty="0"/>
+              <a:t>，交换</a:t>
+            </a:r>
+            <a:r>
+              <a:rPr lang="en-US" altLang="zh-CN" dirty="0" err="1"/>
+              <a:t>dst</a:t>
+            </a:r>
+            <a:r>
+              <a:rPr lang="en-US" altLang="zh-CN" dirty="0"/>
+              <a:t>/</a:t>
+            </a:r>
+            <a:r>
+              <a:rPr lang="en-US" altLang="zh-CN" dirty="0" err="1"/>
+              <a:t>src</a:t>
+            </a:r>
+            <a:r>
+              <a:rPr lang="en-US" altLang="zh-CN" dirty="0"/>
+              <a:t> mac</a:t>
+            </a:r>
+            <a:r>
+              <a:rPr lang="zh-CN" altLang="en-US" dirty="0"/>
+              <a:t>，发出</a:t>
+            </a:r>
+            <a:r>
+              <a:rPr lang="en-US" altLang="zh-CN" dirty="0"/>
+              <a:t>outbound traffic</a:t>
+            </a:r>
+            <a:r>
+              <a:rPr lang="zh-CN" altLang="en-US" dirty="0"/>
+              <a:t>。</a:t>
+            </a:r>
+            <a:endParaRPr lang="en-US" altLang="zh-CN" dirty="0"/>
+          </a:p>
+          <a:p>
+            <a:r>
+              <a:rPr lang="en-US" altLang="zh-CN" dirty="0"/>
+              <a:t>PS</a:t>
+            </a:r>
+            <a:r>
+              <a:rPr lang="zh-CN" altLang="en-US" dirty="0"/>
+              <a:t>：所有的</a:t>
+            </a:r>
+            <a:r>
+              <a:rPr lang="en-US" altLang="zh-CN" dirty="0"/>
+              <a:t>server</a:t>
+            </a:r>
+            <a:r>
+              <a:rPr lang="zh-CN" altLang="en-US" dirty="0"/>
+              <a:t>都要运行</a:t>
+            </a:r>
+            <a:r>
+              <a:rPr lang="en-US" altLang="zh-CN" dirty="0" err="1"/>
+              <a:t>arp</a:t>
+            </a:r>
+            <a:r>
+              <a:rPr lang="zh-CN" altLang="en-US" dirty="0"/>
+              <a:t>程序处理</a:t>
+            </a:r>
+            <a:r>
+              <a:rPr lang="en-US" altLang="zh-CN" dirty="0"/>
+              <a:t>192.168.121.0/24</a:t>
+            </a:r>
+            <a:r>
+              <a:rPr lang="zh-CN" altLang="en-US" dirty="0"/>
+              <a:t>网段的信息，每台</a:t>
+            </a:r>
+            <a:r>
+              <a:rPr lang="en-US" altLang="zh-CN" dirty="0"/>
+              <a:t>server</a:t>
+            </a:r>
+            <a:r>
+              <a:rPr lang="zh-CN" altLang="en-US" dirty="0"/>
+              <a:t>都分配一个</a:t>
+            </a:r>
+            <a:r>
+              <a:rPr lang="en-US" altLang="zh-CN" dirty="0"/>
+              <a:t>192.168.121.0/24</a:t>
+            </a:r>
+            <a:r>
+              <a:rPr lang="zh-CN" altLang="en-US" dirty="0"/>
+              <a:t>的</a:t>
+            </a:r>
+            <a:r>
+              <a:rPr lang="en-US" altLang="zh-CN" dirty="0" err="1"/>
+              <a:t>ip</a:t>
+            </a:r>
+            <a:r>
+              <a:rPr lang="zh-CN" altLang="en-US" dirty="0"/>
+              <a:t>地址（</a:t>
+            </a:r>
+            <a:r>
+              <a:rPr lang="en-US" altLang="zh-CN" dirty="0" err="1"/>
+              <a:t>dpdknic</a:t>
+            </a:r>
+            <a:r>
+              <a:rPr lang="zh-CN" altLang="en-US" dirty="0"/>
+              <a:t>无法处理，需要</a:t>
+            </a:r>
+            <a:r>
+              <a:rPr lang="en-US" altLang="zh-CN" dirty="0"/>
+              <a:t>kernel </a:t>
+            </a:r>
+            <a:r>
+              <a:rPr lang="en-US" altLang="zh-CN" dirty="0" err="1"/>
+              <a:t>nic</a:t>
+            </a:r>
+            <a:r>
+              <a:rPr lang="zh-CN" altLang="en-US" dirty="0"/>
+              <a:t>来处理）。而</a:t>
+            </a:r>
+            <a:r>
+              <a:rPr lang="en-US" altLang="zh-CN" dirty="0"/>
+              <a:t>10.0.0.0/8</a:t>
+            </a:r>
+            <a:r>
+              <a:rPr lang="zh-CN" altLang="en-US" dirty="0"/>
+              <a:t>网段的</a:t>
+            </a:r>
+            <a:r>
+              <a:rPr lang="en-US" altLang="zh-CN" dirty="0"/>
+              <a:t>mac-</a:t>
+            </a:r>
+            <a:r>
+              <a:rPr lang="en-US" altLang="zh-CN" dirty="0" err="1"/>
+              <a:t>ip</a:t>
+            </a:r>
+            <a:r>
+              <a:rPr lang="zh-CN" altLang="en-US" dirty="0"/>
+              <a:t>信息通过</a:t>
+            </a:r>
+            <a:r>
+              <a:rPr lang="en-US" altLang="zh-CN" dirty="0" err="1"/>
+              <a:t>serverAgent</a:t>
+            </a:r>
+            <a:r>
+              <a:rPr lang="zh-CN" altLang="en-US" dirty="0"/>
+              <a:t>发给</a:t>
+            </a:r>
+            <a:r>
+              <a:rPr lang="en-US" altLang="zh-CN" dirty="0"/>
+              <a:t>orchestrator</a:t>
+            </a:r>
+            <a:r>
+              <a:rPr lang="zh-CN" altLang="en-US" dirty="0"/>
+              <a:t>。</a:t>
+            </a:r>
+            <a:endParaRPr lang="en-US" altLang="zh-CN" dirty="0"/>
+          </a:p>
+          <a:p>
+            <a:endParaRPr lang="en-US" altLang="zh-CN" dirty="0"/>
+          </a:p>
+          <a:p>
+            <a:r>
+              <a:rPr lang="en-US" altLang="zh-CN" dirty="0"/>
+              <a:t>Classifier</a:t>
+            </a:r>
+            <a:r>
+              <a:rPr lang="zh-CN" altLang="en-US" dirty="0"/>
+              <a:t>会收到</a:t>
+            </a:r>
+            <a:r>
+              <a:rPr lang="en-US" altLang="zh-CN" dirty="0"/>
+              <a:t>outbound traffic</a:t>
+            </a:r>
+            <a:r>
+              <a:rPr lang="zh-CN" altLang="en-US" dirty="0"/>
+              <a:t>，其中</a:t>
+            </a:r>
+            <a:r>
+              <a:rPr lang="en-US" altLang="zh-CN" dirty="0" err="1"/>
+              <a:t>src</a:t>
+            </a:r>
+            <a:r>
+              <a:rPr lang="en-US" altLang="zh-CN" dirty="0"/>
+              <a:t> </a:t>
+            </a:r>
+            <a:r>
+              <a:rPr lang="en-US" altLang="zh-CN" dirty="0" err="1"/>
+              <a:t>ip</a:t>
+            </a:r>
+            <a:r>
+              <a:rPr lang="zh-CN" altLang="en-US" dirty="0"/>
+              <a:t>是某台</a:t>
+            </a:r>
+            <a:r>
+              <a:rPr lang="en-US" altLang="zh-CN" dirty="0"/>
+              <a:t>website</a:t>
+            </a:r>
+            <a:r>
+              <a:rPr lang="zh-CN" altLang="en-US" dirty="0"/>
+              <a:t>的</a:t>
+            </a:r>
+            <a:r>
+              <a:rPr lang="en-US" altLang="zh-CN" dirty="0" err="1"/>
+              <a:t>ip</a:t>
+            </a:r>
+            <a:r>
+              <a:rPr lang="zh-CN" altLang="en-US" dirty="0"/>
+              <a:t>（匹配</a:t>
+            </a:r>
+            <a:r>
+              <a:rPr lang="en-US" altLang="zh-CN" dirty="0" err="1"/>
+              <a:t>src</a:t>
+            </a:r>
+            <a:r>
+              <a:rPr lang="en-US" altLang="zh-CN" dirty="0"/>
+              <a:t> </a:t>
+            </a:r>
+            <a:r>
+              <a:rPr lang="en-US" altLang="zh-CN" dirty="0" err="1"/>
+              <a:t>ip</a:t>
+            </a:r>
+            <a:r>
+              <a:rPr lang="zh-CN" altLang="en-US" dirty="0"/>
+              <a:t>）</a:t>
+            </a:r>
+            <a:endParaRPr lang="en-US" altLang="zh-CN" dirty="0"/>
+          </a:p>
+          <a:p>
+            <a:r>
+              <a:rPr lang="zh-CN" altLang="en-US" dirty="0"/>
+              <a:t>分类为</a:t>
+            </a:r>
+            <a:r>
+              <a:rPr lang="en-US" altLang="zh-CN" dirty="0"/>
+              <a:t>SFC</a:t>
+            </a:r>
+            <a:r>
+              <a:rPr lang="zh-CN" altLang="en-US" dirty="0"/>
+              <a:t>流（匹配</a:t>
+            </a:r>
+            <a:r>
+              <a:rPr lang="en-US" altLang="zh-CN" dirty="0" err="1"/>
+              <a:t>src</a:t>
+            </a:r>
+            <a:r>
+              <a:rPr lang="en-US" altLang="zh-CN" dirty="0"/>
+              <a:t> </a:t>
+            </a:r>
+            <a:r>
+              <a:rPr lang="en-US" altLang="zh-CN" dirty="0" err="1"/>
+              <a:t>ip</a:t>
+            </a:r>
+            <a:r>
+              <a:rPr lang="zh-CN" altLang="en-US" dirty="0"/>
+              <a:t>）：</a:t>
+            </a:r>
+            <a:endParaRPr lang="en-US" altLang="zh-CN" dirty="0"/>
+          </a:p>
+          <a:p>
+            <a:r>
+              <a:rPr lang="en-US" altLang="zh-CN" dirty="0" err="1"/>
+              <a:t>Decap</a:t>
+            </a:r>
+            <a:r>
+              <a:rPr lang="en-US" altLang="zh-CN" dirty="0"/>
+              <a:t> mac header</a:t>
+            </a:r>
+            <a:r>
+              <a:rPr lang="zh-CN" altLang="en-US" dirty="0"/>
+              <a:t>；</a:t>
+            </a:r>
+            <a:endParaRPr lang="en-US" altLang="zh-CN" dirty="0"/>
+          </a:p>
+          <a:p>
+            <a:r>
+              <a:rPr lang="en-US" altLang="zh-CN" dirty="0" err="1"/>
+              <a:t>Encap</a:t>
+            </a:r>
+            <a:r>
+              <a:rPr lang="en-US" altLang="zh-CN" dirty="0"/>
+              <a:t> </a:t>
+            </a:r>
+            <a:r>
+              <a:rPr lang="en-US" altLang="zh-CN" dirty="0" err="1"/>
+              <a:t>outter</a:t>
+            </a:r>
+            <a:r>
+              <a:rPr lang="en-US" altLang="zh-CN" dirty="0"/>
+              <a:t> </a:t>
+            </a:r>
+            <a:r>
+              <a:rPr lang="en-US" altLang="zh-CN" dirty="0" err="1"/>
+              <a:t>ip</a:t>
+            </a:r>
+            <a:r>
+              <a:rPr lang="en-US" altLang="zh-CN" dirty="0"/>
+              <a:t> header</a:t>
+            </a:r>
+            <a:r>
+              <a:rPr lang="zh-CN" altLang="en-US" dirty="0"/>
+              <a:t>到下一个</a:t>
+            </a:r>
+            <a:r>
+              <a:rPr lang="en-US" altLang="zh-CN" dirty="0"/>
+              <a:t>VNF</a:t>
+            </a:r>
+            <a:r>
+              <a:rPr lang="zh-CN" altLang="en-US" dirty="0"/>
+              <a:t>所在</a:t>
+            </a:r>
+            <a:r>
+              <a:rPr lang="en-US" altLang="zh-CN" dirty="0"/>
+              <a:t>server</a:t>
+            </a:r>
+            <a:r>
+              <a:rPr lang="zh-CN" altLang="en-US" dirty="0"/>
+              <a:t>，</a:t>
+            </a:r>
+            <a:r>
+              <a:rPr lang="en-US" altLang="zh-CN" dirty="0" err="1"/>
+              <a:t>src</a:t>
+            </a:r>
+            <a:r>
+              <a:rPr lang="en-US" altLang="zh-CN" dirty="0"/>
+              <a:t> </a:t>
+            </a:r>
+            <a:r>
+              <a:rPr lang="en-US" altLang="zh-CN" dirty="0" err="1"/>
+              <a:t>ip</a:t>
+            </a:r>
+            <a:r>
+              <a:rPr lang="en-US" altLang="zh-CN" dirty="0"/>
+              <a:t>=Classifier</a:t>
+            </a:r>
+            <a:r>
+              <a:rPr lang="zh-CN" altLang="en-US" dirty="0"/>
+              <a:t>， </a:t>
+            </a:r>
+            <a:r>
+              <a:rPr lang="en-US" altLang="zh-CN" dirty="0" err="1"/>
+              <a:t>dst</a:t>
+            </a:r>
+            <a:r>
+              <a:rPr lang="en-US" altLang="zh-CN" dirty="0"/>
+              <a:t> </a:t>
+            </a:r>
+            <a:r>
+              <a:rPr lang="en-US" altLang="zh-CN" dirty="0" err="1"/>
+              <a:t>ip</a:t>
+            </a:r>
+            <a:r>
+              <a:rPr lang="en-US" altLang="zh-CN" dirty="0"/>
+              <a:t>=</a:t>
+            </a:r>
+            <a:r>
+              <a:rPr lang="en-US" altLang="zh-CN" dirty="0" err="1"/>
+              <a:t>nextServerSFCDomainIP</a:t>
+            </a:r>
+            <a:endParaRPr lang="en-US" altLang="zh-CN" dirty="0"/>
+          </a:p>
+          <a:p>
+            <a:r>
+              <a:rPr lang="en-US" altLang="zh-CN" dirty="0" err="1"/>
+              <a:t>Encap</a:t>
+            </a:r>
+            <a:r>
+              <a:rPr lang="en-US" altLang="zh-CN" dirty="0"/>
+              <a:t> mac header</a:t>
+            </a:r>
+            <a:r>
+              <a:rPr lang="zh-CN" altLang="en-US" dirty="0"/>
+              <a:t>（</a:t>
+            </a:r>
+            <a:r>
+              <a:rPr lang="en-US" altLang="zh-CN" dirty="0" err="1"/>
+              <a:t>src</a:t>
+            </a:r>
+            <a:r>
+              <a:rPr lang="en-US" altLang="zh-CN" dirty="0"/>
+              <a:t> mac=classifier mac</a:t>
+            </a:r>
+            <a:r>
+              <a:rPr lang="zh-CN" altLang="en-US" dirty="0"/>
+              <a:t>；</a:t>
+            </a:r>
+            <a:r>
+              <a:rPr lang="en-US" altLang="zh-CN" dirty="0" err="1"/>
+              <a:t>dst</a:t>
+            </a:r>
+            <a:r>
+              <a:rPr lang="en-US" altLang="zh-CN" dirty="0"/>
+              <a:t> mac=DCN Gateway mac</a:t>
+            </a:r>
+            <a:r>
+              <a:rPr lang="zh-CN" altLang="en-US" dirty="0"/>
+              <a:t>）</a:t>
+            </a:r>
+            <a:endParaRPr lang="en-US" altLang="zh-CN" dirty="0"/>
+          </a:p>
+          <a:p>
+            <a:r>
+              <a:rPr lang="zh-CN" altLang="en-US" dirty="0"/>
+              <a:t>至此</a:t>
+            </a:r>
+            <a:r>
+              <a:rPr lang="en-US" altLang="zh-CN" dirty="0"/>
+              <a:t>outbound traffic</a:t>
+            </a:r>
+            <a:r>
+              <a:rPr lang="zh-CN" altLang="en-US" dirty="0"/>
+              <a:t>进入反向</a:t>
+            </a:r>
+            <a:r>
+              <a:rPr lang="en-US" altLang="zh-CN" dirty="0"/>
+              <a:t>SFC domain</a:t>
+            </a:r>
+            <a:r>
+              <a:rPr lang="zh-CN" altLang="en-US" dirty="0"/>
+              <a:t>。</a:t>
+            </a:r>
+            <a:endParaRPr lang="en-US" altLang="zh-CN" dirty="0"/>
+          </a:p>
+          <a:p>
+            <a:endParaRPr lang="en-US" altLang="zh-CN" dirty="0"/>
+          </a:p>
+          <a:p>
+            <a:r>
+              <a:rPr lang="zh-CN" altLang="en-US" dirty="0"/>
+              <a:t>反向</a:t>
+            </a:r>
+            <a:r>
+              <a:rPr lang="en-US" altLang="zh-CN" dirty="0"/>
+              <a:t>SFC</a:t>
+            </a:r>
+            <a:r>
+              <a:rPr lang="zh-CN" altLang="en-US" dirty="0"/>
+              <a:t>：</a:t>
+            </a:r>
+            <a:r>
+              <a:rPr lang="en-US" altLang="zh-CN" dirty="0"/>
+              <a:t>LB-&gt;FW</a:t>
+            </a:r>
+          </a:p>
+          <a:p>
+            <a:r>
+              <a:rPr lang="zh-CN" altLang="en-US" dirty="0"/>
+              <a:t>最后一个</a:t>
+            </a:r>
+            <a:r>
+              <a:rPr lang="en-US" altLang="zh-CN" dirty="0"/>
+              <a:t>SFF</a:t>
+            </a:r>
+            <a:r>
+              <a:rPr lang="zh-CN" altLang="en-US" dirty="0"/>
+              <a:t>负责解封装，得到</a:t>
+            </a:r>
+            <a:r>
+              <a:rPr lang="en-US" altLang="zh-CN" dirty="0"/>
+              <a:t>inner </a:t>
+            </a:r>
+            <a:r>
+              <a:rPr lang="en-US" altLang="zh-CN" dirty="0" err="1"/>
+              <a:t>src</a:t>
+            </a:r>
+            <a:r>
+              <a:rPr lang="en-US" altLang="zh-CN" dirty="0"/>
+              <a:t> </a:t>
+            </a:r>
+            <a:r>
+              <a:rPr lang="en-US" altLang="zh-CN" dirty="0" err="1"/>
+              <a:t>ip</a:t>
+            </a:r>
+            <a:r>
+              <a:rPr lang="en-US" altLang="zh-CN" dirty="0"/>
+              <a:t>=website</a:t>
+            </a:r>
+            <a:r>
+              <a:rPr lang="zh-CN" altLang="en-US" dirty="0"/>
+              <a:t>（公网</a:t>
+            </a:r>
+            <a:r>
+              <a:rPr lang="en-US" altLang="zh-CN" dirty="0" err="1"/>
+              <a:t>ip</a:t>
+            </a:r>
+            <a:r>
+              <a:rPr lang="zh-CN" altLang="en-US" dirty="0"/>
+              <a:t>），</a:t>
+            </a:r>
+            <a:r>
+              <a:rPr lang="en-US" altLang="zh-CN" dirty="0"/>
+              <a:t>inner </a:t>
+            </a:r>
+            <a:r>
+              <a:rPr lang="en-US" altLang="zh-CN" dirty="0" err="1"/>
+              <a:t>dst</a:t>
+            </a:r>
+            <a:r>
+              <a:rPr lang="en-US" altLang="zh-CN" dirty="0"/>
+              <a:t> </a:t>
+            </a:r>
+            <a:r>
+              <a:rPr lang="en-US" altLang="zh-CN" dirty="0" err="1"/>
+              <a:t>ip</a:t>
+            </a:r>
+            <a:r>
+              <a:rPr lang="en-US" altLang="zh-CN" dirty="0"/>
+              <a:t>=web</a:t>
+            </a:r>
+            <a:r>
+              <a:rPr lang="zh-CN" altLang="en-US" dirty="0"/>
+              <a:t>用户的</a:t>
+            </a:r>
+            <a:r>
+              <a:rPr lang="en-US" altLang="zh-CN" dirty="0" err="1"/>
+              <a:t>ip</a:t>
+            </a:r>
+            <a:r>
+              <a:rPr lang="zh-CN" altLang="en-US" dirty="0"/>
+              <a:t>；</a:t>
+            </a:r>
+            <a:endParaRPr lang="en-US" altLang="zh-CN" dirty="0"/>
+          </a:p>
+          <a:p>
+            <a:r>
+              <a:rPr lang="zh-CN" altLang="en-US" dirty="0"/>
+              <a:t>因为是</a:t>
+            </a:r>
+            <a:r>
+              <a:rPr lang="en-US" altLang="zh-CN" dirty="0"/>
+              <a:t>public </a:t>
+            </a:r>
+            <a:r>
+              <a:rPr lang="en-US" altLang="zh-CN" dirty="0" err="1"/>
+              <a:t>ip</a:t>
+            </a:r>
+            <a:r>
+              <a:rPr lang="zh-CN" altLang="en-US" dirty="0"/>
+              <a:t>，所以需要路由到</a:t>
+            </a:r>
+            <a:r>
+              <a:rPr lang="en-US" altLang="zh-CN" dirty="0"/>
+              <a:t>DCN Gateway</a:t>
+            </a:r>
+            <a:r>
+              <a:rPr lang="zh-CN" altLang="en-US" dirty="0"/>
+              <a:t>：</a:t>
+            </a:r>
+            <a:r>
+              <a:rPr lang="en-US" altLang="zh-CN" dirty="0" err="1"/>
+              <a:t>src</a:t>
+            </a:r>
+            <a:r>
+              <a:rPr lang="en-US" altLang="zh-CN" dirty="0"/>
+              <a:t> mac</a:t>
+            </a:r>
+            <a:r>
+              <a:rPr lang="zh-CN" altLang="en-US" dirty="0"/>
+              <a:t>填写本机，</a:t>
+            </a:r>
+            <a:r>
+              <a:rPr lang="en-US" altLang="zh-CN" dirty="0" err="1"/>
+              <a:t>dst</a:t>
+            </a:r>
+            <a:r>
+              <a:rPr lang="en-US" altLang="zh-CN" dirty="0"/>
+              <a:t> mac </a:t>
+            </a:r>
+            <a:r>
+              <a:rPr lang="zh-CN" altLang="en-US" dirty="0"/>
+              <a:t>填写</a:t>
+            </a:r>
+            <a:r>
+              <a:rPr lang="en-US" altLang="zh-CN" dirty="0"/>
+              <a:t>Gateway</a:t>
+            </a:r>
+          </a:p>
+          <a:p>
+            <a:endParaRPr lang="en-US" altLang="zh-CN" dirty="0"/>
+          </a:p>
+        </p:txBody>
+      </p:sp>
+      <p:sp>
+        <p:nvSpPr>
+          <p:cNvPr id="4" name="灯片编号占位符 3"/>
+          <p:cNvSpPr>
+            <a:spLocks noGrp="1"/>
+          </p:cNvSpPr>
+          <p:nvPr>
+            <p:ph type="sldNum" sz="quarter" idx="5"/>
+          </p:nvPr>
+        </p:nvSpPr>
+        <p:spPr/>
+        <p:txBody>
+          <a:bodyPr/>
+          <a:lstStyle/>
+          <a:p>
+            <a:fld id="{2C092C30-C02F-48DE-947D-311697961749}" type="slidenum">
+              <a:rPr lang="zh-CN" altLang="en-US" smtClean="0"/>
+              <a:t>6</a:t>
+            </a:fld>
+            <a:endParaRPr lang="zh-CN" altLang="en-US"/>
+          </a:p>
+        </p:txBody>
+      </p:sp>
+    </p:spTree>
+    <p:extLst>
+      <p:ext uri="{BB962C8B-B14F-4D97-AF65-F5344CB8AC3E}">
+        <p14:creationId xmlns:p14="http://schemas.microsoft.com/office/powerpoint/2010/main" val="1322585244"/>
       </p:ext>
     </p:extLst>
   </p:cSld>
@@ -8737,6 +10911,1910 @@
     <p:extLst>
       <p:ext uri="{BB962C8B-B14F-4D97-AF65-F5344CB8AC3E}">
         <p14:creationId xmlns:p14="http://schemas.microsoft.com/office/powerpoint/2010/main" val="3126368743"/>
+      </p:ext>
+    </p:extLst>
+  </p:cSld>
+  <p:clrMapOvr>
+    <a:masterClrMapping/>
+  </p:clrMapOvr>
+</p:sld>
+</file>
+
+<file path=ppt/slides/slide6.xml><?xml version="1.0" encoding="utf-8"?>
+<p:sld xmlns:a="http://schemas.openxmlformats.org/drawingml/2006/main" xmlns:r="http://schemas.openxmlformats.org/officeDocument/2006/relationships" xmlns:p="http://schemas.openxmlformats.org/presentationml/2006/main">
+  <p:cSld>
+    <p:spTree>
+      <p:nvGrpSpPr>
+        <p:cNvPr id="1" name=""/>
+        <p:cNvGrpSpPr/>
+        <p:nvPr/>
+      </p:nvGrpSpPr>
+      <p:grpSpPr>
+        <a:xfrm>
+          <a:off x="0" y="0"/>
+          <a:ext cx="0" cy="0"/>
+          <a:chOff x="0" y="0"/>
+          <a:chExt cx="0" cy="0"/>
+        </a:xfrm>
+      </p:grpSpPr>
+      <p:sp>
+        <p:nvSpPr>
+          <p:cNvPr id="48" name="矩形: 圆角 47">
+            <a:extLst>
+              <a:ext uri="{FF2B5EF4-FFF2-40B4-BE49-F238E27FC236}">
+                <a16:creationId xmlns:a16="http://schemas.microsoft.com/office/drawing/2014/main" id="{E325E0DA-EBFF-438A-8539-D3223779BB78}"/>
+              </a:ext>
+            </a:extLst>
+          </p:cNvPr>
+          <p:cNvSpPr/>
+          <p:nvPr/>
+        </p:nvSpPr>
+        <p:spPr>
+          <a:xfrm>
+            <a:off x="8362226" y="2415219"/>
+            <a:ext cx="1890725" cy="1062627"/>
+          </a:xfrm>
+          <a:prstGeom prst="roundRect">
+            <a:avLst/>
+          </a:prstGeom>
+        </p:spPr>
+        <p:style>
+          <a:lnRef idx="1">
+            <a:schemeClr val="accent3"/>
+          </a:lnRef>
+          <a:fillRef idx="2">
+            <a:schemeClr val="accent3"/>
+          </a:fillRef>
+          <a:effectRef idx="1">
+            <a:schemeClr val="accent3"/>
+          </a:effectRef>
+          <a:fontRef idx="minor">
+            <a:schemeClr val="dk1"/>
+          </a:fontRef>
+        </p:style>
+        <p:txBody>
+          <a:bodyPr rtlCol="0" anchor="ctr"/>
+          <a:lstStyle/>
+          <a:p>
+            <a:pPr algn="ctr"/>
+            <a:endParaRPr lang="zh-CN" altLang="en-US" dirty="0"/>
+          </a:p>
+        </p:txBody>
+      </p:sp>
+      <p:sp>
+        <p:nvSpPr>
+          <p:cNvPr id="49" name="矩形: 圆角 48">
+            <a:extLst>
+              <a:ext uri="{FF2B5EF4-FFF2-40B4-BE49-F238E27FC236}">
+                <a16:creationId xmlns:a16="http://schemas.microsoft.com/office/drawing/2014/main" id="{3A19A6EA-B330-41AD-9F66-7DA5AB365E5E}"/>
+              </a:ext>
+            </a:extLst>
+          </p:cNvPr>
+          <p:cNvSpPr/>
+          <p:nvPr/>
+        </p:nvSpPr>
+        <p:spPr>
+          <a:xfrm>
+            <a:off x="1873683" y="2382410"/>
+            <a:ext cx="1890725" cy="1062627"/>
+          </a:xfrm>
+          <a:prstGeom prst="roundRect">
+            <a:avLst/>
+          </a:prstGeom>
+        </p:spPr>
+        <p:style>
+          <a:lnRef idx="1">
+            <a:schemeClr val="accent3"/>
+          </a:lnRef>
+          <a:fillRef idx="2">
+            <a:schemeClr val="accent3"/>
+          </a:fillRef>
+          <a:effectRef idx="1">
+            <a:schemeClr val="accent3"/>
+          </a:effectRef>
+          <a:fontRef idx="minor">
+            <a:schemeClr val="dk1"/>
+          </a:fontRef>
+        </p:style>
+        <p:txBody>
+          <a:bodyPr rtlCol="0" anchor="ctr"/>
+          <a:lstStyle/>
+          <a:p>
+            <a:pPr algn="ctr"/>
+            <a:endParaRPr lang="zh-CN" altLang="en-US" dirty="0"/>
+          </a:p>
+        </p:txBody>
+      </p:sp>
+      <p:sp>
+        <p:nvSpPr>
+          <p:cNvPr id="44" name="矩形: 圆角 43">
+            <a:extLst>
+              <a:ext uri="{FF2B5EF4-FFF2-40B4-BE49-F238E27FC236}">
+                <a16:creationId xmlns:a16="http://schemas.microsoft.com/office/drawing/2014/main" id="{8E29D6DA-7AF3-400C-BBEC-DCD27B3EDC0D}"/>
+              </a:ext>
+            </a:extLst>
+          </p:cNvPr>
+          <p:cNvSpPr/>
+          <p:nvPr/>
+        </p:nvSpPr>
+        <p:spPr>
+          <a:xfrm>
+            <a:off x="4659748" y="2652649"/>
+            <a:ext cx="3069227" cy="2107504"/>
+          </a:xfrm>
+          <a:prstGeom prst="roundRect">
+            <a:avLst/>
+          </a:prstGeom>
+        </p:spPr>
+        <p:style>
+          <a:lnRef idx="1">
+            <a:schemeClr val="accent3"/>
+          </a:lnRef>
+          <a:fillRef idx="2">
+            <a:schemeClr val="accent3"/>
+          </a:fillRef>
+          <a:effectRef idx="1">
+            <a:schemeClr val="accent3"/>
+          </a:effectRef>
+          <a:fontRef idx="minor">
+            <a:schemeClr val="dk1"/>
+          </a:fontRef>
+        </p:style>
+        <p:txBody>
+          <a:bodyPr rtlCol="0" anchor="ctr"/>
+          <a:lstStyle/>
+          <a:p>
+            <a:pPr algn="ctr"/>
+            <a:endParaRPr lang="zh-CN" altLang="en-US" dirty="0"/>
+          </a:p>
+        </p:txBody>
+      </p:sp>
+      <p:sp>
+        <p:nvSpPr>
+          <p:cNvPr id="2" name="标题 1">
+            <a:extLst>
+              <a:ext uri="{FF2B5EF4-FFF2-40B4-BE49-F238E27FC236}">
+                <a16:creationId xmlns:a16="http://schemas.microsoft.com/office/drawing/2014/main" id="{16FFD267-FAB5-4CC9-86C7-800FDF0B86AD}"/>
+              </a:ext>
+            </a:extLst>
+          </p:cNvPr>
+          <p:cNvSpPr>
+            <a:spLocks noGrp="1"/>
+          </p:cNvSpPr>
+          <p:nvPr>
+            <p:ph type="title"/>
+          </p:nvPr>
+        </p:nvSpPr>
+        <p:spPr/>
+        <p:txBody>
+          <a:bodyPr/>
+          <a:lstStyle/>
+          <a:p>
+            <a:r>
+              <a:rPr lang="en-US" altLang="zh-CN" dirty="0"/>
+              <a:t>Show</a:t>
+            </a:r>
+            <a:endParaRPr lang="zh-CN" altLang="en-US" dirty="0"/>
+          </a:p>
+        </p:txBody>
+      </p:sp>
+      <p:sp>
+        <p:nvSpPr>
+          <p:cNvPr id="5" name="椭圆 4">
+            <a:extLst>
+              <a:ext uri="{FF2B5EF4-FFF2-40B4-BE49-F238E27FC236}">
+                <a16:creationId xmlns:a16="http://schemas.microsoft.com/office/drawing/2014/main" id="{F46BA4A4-FDAA-4D4B-AA43-AC346A00C2A7}"/>
+              </a:ext>
+            </a:extLst>
+          </p:cNvPr>
+          <p:cNvSpPr/>
+          <p:nvPr/>
+        </p:nvSpPr>
+        <p:spPr>
+          <a:xfrm>
+            <a:off x="4740266" y="2732461"/>
+            <a:ext cx="834312" cy="818585"/>
+          </a:xfrm>
+          <a:prstGeom prst="ellipse">
+            <a:avLst/>
+          </a:prstGeom>
+          <a:ln w="38100"/>
+        </p:spPr>
+        <p:style>
+          <a:lnRef idx="2">
+            <a:schemeClr val="dk1"/>
+          </a:lnRef>
+          <a:fillRef idx="1">
+            <a:schemeClr val="lt1"/>
+          </a:fillRef>
+          <a:effectRef idx="0">
+            <a:schemeClr val="dk1"/>
+          </a:effectRef>
+          <a:fontRef idx="minor">
+            <a:schemeClr val="dk1"/>
+          </a:fontRef>
+        </p:style>
+        <p:txBody>
+          <a:bodyPr rtlCol="0" anchor="ctr"/>
+          <a:lstStyle/>
+          <a:p>
+            <a:pPr algn="ctr"/>
+            <a:r>
+              <a:rPr lang="en-US" altLang="zh-CN" dirty="0"/>
+              <a:t>P4</a:t>
+            </a:r>
+            <a:endParaRPr lang="zh-CN" altLang="en-US" dirty="0"/>
+          </a:p>
+        </p:txBody>
+      </p:sp>
+      <p:sp>
+        <p:nvSpPr>
+          <p:cNvPr id="7" name="椭圆 6">
+            <a:extLst>
+              <a:ext uri="{FF2B5EF4-FFF2-40B4-BE49-F238E27FC236}">
+                <a16:creationId xmlns:a16="http://schemas.microsoft.com/office/drawing/2014/main" id="{4E0E486C-6003-48F1-8811-A8238ECA0A6C}"/>
+              </a:ext>
+            </a:extLst>
+          </p:cNvPr>
+          <p:cNvSpPr/>
+          <p:nvPr/>
+        </p:nvSpPr>
+        <p:spPr>
+          <a:xfrm>
+            <a:off x="6729967" y="2732461"/>
+            <a:ext cx="834312" cy="818585"/>
+          </a:xfrm>
+          <a:prstGeom prst="ellipse">
+            <a:avLst/>
+          </a:prstGeom>
+          <a:ln w="38100"/>
+        </p:spPr>
+        <p:style>
+          <a:lnRef idx="2">
+            <a:schemeClr val="dk1"/>
+          </a:lnRef>
+          <a:fillRef idx="1">
+            <a:schemeClr val="lt1"/>
+          </a:fillRef>
+          <a:effectRef idx="0">
+            <a:schemeClr val="dk1"/>
+          </a:effectRef>
+          <a:fontRef idx="minor">
+            <a:schemeClr val="dk1"/>
+          </a:fontRef>
+        </p:style>
+        <p:txBody>
+          <a:bodyPr rtlCol="0" anchor="ctr"/>
+          <a:lstStyle/>
+          <a:p>
+            <a:pPr algn="ctr"/>
+            <a:r>
+              <a:rPr lang="en-US" altLang="zh-CN" dirty="0"/>
+              <a:t>P4</a:t>
+            </a:r>
+            <a:endParaRPr lang="zh-CN" altLang="en-US" dirty="0"/>
+          </a:p>
+        </p:txBody>
+      </p:sp>
+      <p:cxnSp>
+        <p:nvCxnSpPr>
+          <p:cNvPr id="18" name="直接连接符 17">
+            <a:extLst>
+              <a:ext uri="{FF2B5EF4-FFF2-40B4-BE49-F238E27FC236}">
+                <a16:creationId xmlns:a16="http://schemas.microsoft.com/office/drawing/2014/main" id="{20CCD7C3-89C0-498C-A526-9CB62D80AE34}"/>
+              </a:ext>
+            </a:extLst>
+          </p:cNvPr>
+          <p:cNvCxnSpPr>
+            <a:cxnSpLocks/>
+            <a:stCxn id="58" idx="2"/>
+            <a:endCxn id="5" idx="4"/>
+          </p:cNvCxnSpPr>
+          <p:nvPr/>
+        </p:nvCxnSpPr>
+        <p:spPr>
+          <a:xfrm flipH="1" flipV="1">
+            <a:off x="5157422" y="3551046"/>
+            <a:ext cx="623076" cy="799701"/>
+          </a:xfrm>
+          <a:prstGeom prst="line">
+            <a:avLst/>
+          </a:prstGeom>
+          <a:ln w="38100"/>
+        </p:spPr>
+        <p:style>
+          <a:lnRef idx="2">
+            <a:schemeClr val="dk1"/>
+          </a:lnRef>
+          <a:fillRef idx="1">
+            <a:schemeClr val="lt1"/>
+          </a:fillRef>
+          <a:effectRef idx="0">
+            <a:schemeClr val="dk1"/>
+          </a:effectRef>
+          <a:fontRef idx="minor">
+            <a:schemeClr val="dk1"/>
+          </a:fontRef>
+        </p:style>
+      </p:cxnSp>
+      <p:cxnSp>
+        <p:nvCxnSpPr>
+          <p:cNvPr id="21" name="直接连接符 20">
+            <a:extLst>
+              <a:ext uri="{FF2B5EF4-FFF2-40B4-BE49-F238E27FC236}">
+                <a16:creationId xmlns:a16="http://schemas.microsoft.com/office/drawing/2014/main" id="{D9F1A309-EAB1-48A0-B2C1-60510B6BFCBB}"/>
+              </a:ext>
+            </a:extLst>
+          </p:cNvPr>
+          <p:cNvCxnSpPr>
+            <a:cxnSpLocks/>
+            <a:stCxn id="7" idx="2"/>
+            <a:endCxn id="5" idx="6"/>
+          </p:cNvCxnSpPr>
+          <p:nvPr/>
+        </p:nvCxnSpPr>
+        <p:spPr>
+          <a:xfrm flipH="1">
+            <a:off x="5574578" y="3141754"/>
+            <a:ext cx="1155389" cy="0"/>
+          </a:xfrm>
+          <a:prstGeom prst="line">
+            <a:avLst/>
+          </a:prstGeom>
+          <a:ln w="38100"/>
+        </p:spPr>
+        <p:style>
+          <a:lnRef idx="2">
+            <a:schemeClr val="dk1"/>
+          </a:lnRef>
+          <a:fillRef idx="1">
+            <a:schemeClr val="lt1"/>
+          </a:fillRef>
+          <a:effectRef idx="0">
+            <a:schemeClr val="dk1"/>
+          </a:effectRef>
+          <a:fontRef idx="minor">
+            <a:schemeClr val="dk1"/>
+          </a:fontRef>
+        </p:style>
+      </p:cxnSp>
+      <p:sp>
+        <p:nvSpPr>
+          <p:cNvPr id="25" name="矩形 24">
+            <a:extLst>
+              <a:ext uri="{FF2B5EF4-FFF2-40B4-BE49-F238E27FC236}">
+                <a16:creationId xmlns:a16="http://schemas.microsoft.com/office/drawing/2014/main" id="{ED1327BF-09D2-4ED6-888D-F5F990F3C248}"/>
+              </a:ext>
+            </a:extLst>
+          </p:cNvPr>
+          <p:cNvSpPr/>
+          <p:nvPr/>
+        </p:nvSpPr>
+        <p:spPr>
+          <a:xfrm>
+            <a:off x="2974976" y="2442010"/>
+            <a:ext cx="764438" cy="455507"/>
+          </a:xfrm>
+          <a:prstGeom prst="rect">
+            <a:avLst/>
+          </a:prstGeom>
+          <a:ln w="38100"/>
+        </p:spPr>
+        <p:style>
+          <a:lnRef idx="2">
+            <a:schemeClr val="dk1"/>
+          </a:lnRef>
+          <a:fillRef idx="1">
+            <a:schemeClr val="lt1"/>
+          </a:fillRef>
+          <a:effectRef idx="0">
+            <a:schemeClr val="dk1"/>
+          </a:effectRef>
+          <a:fontRef idx="minor">
+            <a:schemeClr val="dk1"/>
+          </a:fontRef>
+        </p:style>
+        <p:txBody>
+          <a:bodyPr rtlCol="0" anchor="ctr"/>
+          <a:lstStyle/>
+          <a:p>
+            <a:pPr algn="ctr"/>
+            <a:r>
+              <a:rPr lang="en-US" altLang="zh-CN" dirty="0">
+                <a:solidFill>
+                  <a:schemeClr val="dk1"/>
+                </a:solidFill>
+              </a:rPr>
+              <a:t>BESS</a:t>
+            </a:r>
+            <a:endParaRPr lang="zh-CN" altLang="en-US" dirty="0">
+              <a:solidFill>
+                <a:schemeClr val="dk1"/>
+              </a:solidFill>
+            </a:endParaRPr>
+          </a:p>
+        </p:txBody>
+      </p:sp>
+      <p:sp>
+        <p:nvSpPr>
+          <p:cNvPr id="26" name="矩形 25">
+            <a:extLst>
+              <a:ext uri="{FF2B5EF4-FFF2-40B4-BE49-F238E27FC236}">
+                <a16:creationId xmlns:a16="http://schemas.microsoft.com/office/drawing/2014/main" id="{45B92116-640E-46FB-921D-F3C663FA6E00}"/>
+              </a:ext>
+            </a:extLst>
+          </p:cNvPr>
+          <p:cNvSpPr/>
+          <p:nvPr/>
+        </p:nvSpPr>
+        <p:spPr>
+          <a:xfrm>
+            <a:off x="8462731" y="2449920"/>
+            <a:ext cx="764438" cy="455507"/>
+          </a:xfrm>
+          <a:prstGeom prst="rect">
+            <a:avLst/>
+          </a:prstGeom>
+          <a:ln w="38100"/>
+        </p:spPr>
+        <p:style>
+          <a:lnRef idx="2">
+            <a:schemeClr val="dk1"/>
+          </a:lnRef>
+          <a:fillRef idx="1">
+            <a:schemeClr val="lt1"/>
+          </a:fillRef>
+          <a:effectRef idx="0">
+            <a:schemeClr val="dk1"/>
+          </a:effectRef>
+          <a:fontRef idx="minor">
+            <a:schemeClr val="dk1"/>
+          </a:fontRef>
+        </p:style>
+        <p:txBody>
+          <a:bodyPr rtlCol="0" anchor="ctr"/>
+          <a:lstStyle/>
+          <a:p>
+            <a:pPr algn="ctr"/>
+            <a:r>
+              <a:rPr lang="en-US" altLang="zh-CN" dirty="0">
+                <a:solidFill>
+                  <a:schemeClr val="dk1"/>
+                </a:solidFill>
+              </a:rPr>
+              <a:t>BESS</a:t>
+            </a:r>
+            <a:endParaRPr lang="zh-CN" altLang="en-US" dirty="0">
+              <a:solidFill>
+                <a:schemeClr val="dk1"/>
+              </a:solidFill>
+            </a:endParaRPr>
+          </a:p>
+        </p:txBody>
+      </p:sp>
+      <p:sp>
+        <p:nvSpPr>
+          <p:cNvPr id="27" name="矩形 26">
+            <a:extLst>
+              <a:ext uri="{FF2B5EF4-FFF2-40B4-BE49-F238E27FC236}">
+                <a16:creationId xmlns:a16="http://schemas.microsoft.com/office/drawing/2014/main" id="{E3142639-7F2F-4C44-814C-54D2781F5574}"/>
+              </a:ext>
+            </a:extLst>
+          </p:cNvPr>
+          <p:cNvSpPr/>
+          <p:nvPr/>
+        </p:nvSpPr>
+        <p:spPr>
+          <a:xfrm>
+            <a:off x="5692746" y="5421766"/>
+            <a:ext cx="993980" cy="453916"/>
+          </a:xfrm>
+          <a:prstGeom prst="rect">
+            <a:avLst/>
+          </a:prstGeom>
+          <a:ln w="38100"/>
+        </p:spPr>
+        <p:style>
+          <a:lnRef idx="2">
+            <a:schemeClr val="dk1"/>
+          </a:lnRef>
+          <a:fillRef idx="1">
+            <a:schemeClr val="lt1"/>
+          </a:fillRef>
+          <a:effectRef idx="0">
+            <a:schemeClr val="dk1"/>
+          </a:effectRef>
+          <a:fontRef idx="minor">
+            <a:schemeClr val="dk1"/>
+          </a:fontRef>
+        </p:style>
+        <p:txBody>
+          <a:bodyPr rtlCol="0" anchor="ctr"/>
+          <a:lstStyle/>
+          <a:p>
+            <a:pPr algn="ctr"/>
+            <a:r>
+              <a:rPr lang="en-US" altLang="zh-CN" dirty="0">
+                <a:solidFill>
+                  <a:schemeClr val="dk1"/>
+                </a:solidFill>
+              </a:rPr>
+              <a:t>Ingress</a:t>
+            </a:r>
+            <a:endParaRPr lang="zh-CN" altLang="en-US" dirty="0">
+              <a:solidFill>
+                <a:schemeClr val="dk1"/>
+              </a:solidFill>
+            </a:endParaRPr>
+          </a:p>
+        </p:txBody>
+      </p:sp>
+      <p:cxnSp>
+        <p:nvCxnSpPr>
+          <p:cNvPr id="32" name="直接连接符 31">
+            <a:extLst>
+              <a:ext uri="{FF2B5EF4-FFF2-40B4-BE49-F238E27FC236}">
+                <a16:creationId xmlns:a16="http://schemas.microsoft.com/office/drawing/2014/main" id="{B883CDDD-AB62-42D0-B084-83FC63C4AD97}"/>
+              </a:ext>
+            </a:extLst>
+          </p:cNvPr>
+          <p:cNvCxnSpPr>
+            <a:cxnSpLocks/>
+            <a:stCxn id="58" idx="4"/>
+            <a:endCxn id="27" idx="0"/>
+          </p:cNvCxnSpPr>
+          <p:nvPr/>
+        </p:nvCxnSpPr>
+        <p:spPr>
+          <a:xfrm flipH="1">
+            <a:off x="6189736" y="4760039"/>
+            <a:ext cx="7918" cy="661727"/>
+          </a:xfrm>
+          <a:prstGeom prst="line">
+            <a:avLst/>
+          </a:prstGeom>
+          <a:ln w="38100"/>
+        </p:spPr>
+        <p:style>
+          <a:lnRef idx="2">
+            <a:schemeClr val="dk1"/>
+          </a:lnRef>
+          <a:fillRef idx="1">
+            <a:schemeClr val="lt1"/>
+          </a:fillRef>
+          <a:effectRef idx="0">
+            <a:schemeClr val="dk1"/>
+          </a:effectRef>
+          <a:fontRef idx="minor">
+            <a:schemeClr val="dk1"/>
+          </a:fontRef>
+        </p:style>
+      </p:cxnSp>
+      <p:cxnSp>
+        <p:nvCxnSpPr>
+          <p:cNvPr id="50" name="直接连接符 49">
+            <a:extLst>
+              <a:ext uri="{FF2B5EF4-FFF2-40B4-BE49-F238E27FC236}">
+                <a16:creationId xmlns:a16="http://schemas.microsoft.com/office/drawing/2014/main" id="{AD08DB53-6523-4D64-B1A6-8C53589AC0FE}"/>
+              </a:ext>
+            </a:extLst>
+          </p:cNvPr>
+          <p:cNvCxnSpPr>
+            <a:cxnSpLocks/>
+            <a:stCxn id="5" idx="2"/>
+            <a:endCxn id="25" idx="3"/>
+          </p:cNvCxnSpPr>
+          <p:nvPr/>
+        </p:nvCxnSpPr>
+        <p:spPr>
+          <a:xfrm flipH="1" flipV="1">
+            <a:off x="3739414" y="2669764"/>
+            <a:ext cx="1000852" cy="471990"/>
+          </a:xfrm>
+          <a:prstGeom prst="line">
+            <a:avLst/>
+          </a:prstGeom>
+          <a:ln w="38100"/>
+        </p:spPr>
+        <p:style>
+          <a:lnRef idx="2">
+            <a:schemeClr val="dk1"/>
+          </a:lnRef>
+          <a:fillRef idx="1">
+            <a:schemeClr val="lt1"/>
+          </a:fillRef>
+          <a:effectRef idx="0">
+            <a:schemeClr val="dk1"/>
+          </a:effectRef>
+          <a:fontRef idx="minor">
+            <a:schemeClr val="dk1"/>
+          </a:fontRef>
+        </p:style>
+      </p:cxnSp>
+      <p:sp>
+        <p:nvSpPr>
+          <p:cNvPr id="74" name="矩形 73">
+            <a:extLst>
+              <a:ext uri="{FF2B5EF4-FFF2-40B4-BE49-F238E27FC236}">
+                <a16:creationId xmlns:a16="http://schemas.microsoft.com/office/drawing/2014/main" id="{55B4E74F-856E-4489-83CA-EB1FB1CBEBBD}"/>
+              </a:ext>
+            </a:extLst>
+          </p:cNvPr>
+          <p:cNvSpPr/>
+          <p:nvPr/>
+        </p:nvSpPr>
+        <p:spPr>
+          <a:xfrm>
+            <a:off x="2037382" y="2444146"/>
+            <a:ext cx="764438" cy="455507"/>
+          </a:xfrm>
+          <a:prstGeom prst="rect">
+            <a:avLst/>
+          </a:prstGeom>
+          <a:ln w="38100"/>
+        </p:spPr>
+        <p:style>
+          <a:lnRef idx="2">
+            <a:schemeClr val="dk1"/>
+          </a:lnRef>
+          <a:fillRef idx="1">
+            <a:schemeClr val="lt1"/>
+          </a:fillRef>
+          <a:effectRef idx="0">
+            <a:schemeClr val="dk1"/>
+          </a:effectRef>
+          <a:fontRef idx="minor">
+            <a:schemeClr val="dk1"/>
+          </a:fontRef>
+        </p:style>
+        <p:txBody>
+          <a:bodyPr rtlCol="0" anchor="ctr"/>
+          <a:lstStyle/>
+          <a:p>
+            <a:pPr algn="ctr"/>
+            <a:r>
+              <a:rPr lang="en-US" altLang="zh-CN" dirty="0">
+                <a:solidFill>
+                  <a:schemeClr val="dk1"/>
+                </a:solidFill>
+              </a:rPr>
+              <a:t>VNF1</a:t>
+            </a:r>
+            <a:endParaRPr lang="zh-CN" altLang="en-US" dirty="0">
+              <a:solidFill>
+                <a:schemeClr val="dk1"/>
+              </a:solidFill>
+            </a:endParaRPr>
+          </a:p>
+        </p:txBody>
+      </p:sp>
+      <p:sp>
+        <p:nvSpPr>
+          <p:cNvPr id="75" name="矩形 74">
+            <a:extLst>
+              <a:ext uri="{FF2B5EF4-FFF2-40B4-BE49-F238E27FC236}">
+                <a16:creationId xmlns:a16="http://schemas.microsoft.com/office/drawing/2014/main" id="{D72BA265-2392-4B0E-9BF0-56F7547C42BB}"/>
+              </a:ext>
+            </a:extLst>
+          </p:cNvPr>
+          <p:cNvSpPr/>
+          <p:nvPr/>
+        </p:nvSpPr>
+        <p:spPr>
+          <a:xfrm>
+            <a:off x="9400754" y="2452057"/>
+            <a:ext cx="764438" cy="455507"/>
+          </a:xfrm>
+          <a:prstGeom prst="rect">
+            <a:avLst/>
+          </a:prstGeom>
+          <a:ln w="38100"/>
+        </p:spPr>
+        <p:style>
+          <a:lnRef idx="2">
+            <a:schemeClr val="dk1"/>
+          </a:lnRef>
+          <a:fillRef idx="1">
+            <a:schemeClr val="lt1"/>
+          </a:fillRef>
+          <a:effectRef idx="0">
+            <a:schemeClr val="dk1"/>
+          </a:effectRef>
+          <a:fontRef idx="minor">
+            <a:schemeClr val="dk1"/>
+          </a:fontRef>
+        </p:style>
+        <p:txBody>
+          <a:bodyPr rtlCol="0" anchor="ctr"/>
+          <a:lstStyle/>
+          <a:p>
+            <a:pPr algn="ctr"/>
+            <a:r>
+              <a:rPr lang="en-US" altLang="zh-CN" dirty="0">
+                <a:solidFill>
+                  <a:schemeClr val="dk1"/>
+                </a:solidFill>
+              </a:rPr>
+              <a:t>VNF1</a:t>
+            </a:r>
+            <a:endParaRPr lang="zh-CN" altLang="en-US" dirty="0">
+              <a:solidFill>
+                <a:schemeClr val="dk1"/>
+              </a:solidFill>
+            </a:endParaRPr>
+          </a:p>
+        </p:txBody>
+      </p:sp>
+      <p:cxnSp>
+        <p:nvCxnSpPr>
+          <p:cNvPr id="76" name="直接连接符 75">
+            <a:extLst>
+              <a:ext uri="{FF2B5EF4-FFF2-40B4-BE49-F238E27FC236}">
+                <a16:creationId xmlns:a16="http://schemas.microsoft.com/office/drawing/2014/main" id="{7952ABC4-35FE-4291-8E09-1A6723DC69C8}"/>
+              </a:ext>
+            </a:extLst>
+          </p:cNvPr>
+          <p:cNvCxnSpPr>
+            <a:cxnSpLocks/>
+            <a:stCxn id="25" idx="1"/>
+            <a:endCxn id="74" idx="3"/>
+          </p:cNvCxnSpPr>
+          <p:nvPr/>
+        </p:nvCxnSpPr>
+        <p:spPr>
+          <a:xfrm flipH="1">
+            <a:off x="2801820" y="2669764"/>
+            <a:ext cx="173156" cy="2136"/>
+          </a:xfrm>
+          <a:prstGeom prst="line">
+            <a:avLst/>
+          </a:prstGeom>
+          <a:ln w="38100"/>
+        </p:spPr>
+        <p:style>
+          <a:lnRef idx="2">
+            <a:schemeClr val="dk1"/>
+          </a:lnRef>
+          <a:fillRef idx="1">
+            <a:schemeClr val="lt1"/>
+          </a:fillRef>
+          <a:effectRef idx="0">
+            <a:schemeClr val="dk1"/>
+          </a:effectRef>
+          <a:fontRef idx="minor">
+            <a:schemeClr val="dk1"/>
+          </a:fontRef>
+        </p:style>
+      </p:cxnSp>
+      <p:cxnSp>
+        <p:nvCxnSpPr>
+          <p:cNvPr id="79" name="直接连接符 78">
+            <a:extLst>
+              <a:ext uri="{FF2B5EF4-FFF2-40B4-BE49-F238E27FC236}">
+                <a16:creationId xmlns:a16="http://schemas.microsoft.com/office/drawing/2014/main" id="{88A7FF69-B49E-4529-96FE-914ACAAFCB72}"/>
+              </a:ext>
+            </a:extLst>
+          </p:cNvPr>
+          <p:cNvCxnSpPr>
+            <a:cxnSpLocks/>
+            <a:stCxn id="75" idx="1"/>
+            <a:endCxn id="26" idx="3"/>
+          </p:cNvCxnSpPr>
+          <p:nvPr/>
+        </p:nvCxnSpPr>
+        <p:spPr>
+          <a:xfrm flipH="1" flipV="1">
+            <a:off x="9227169" y="2677674"/>
+            <a:ext cx="173585" cy="2137"/>
+          </a:xfrm>
+          <a:prstGeom prst="line">
+            <a:avLst/>
+          </a:prstGeom>
+          <a:ln w="38100"/>
+        </p:spPr>
+        <p:style>
+          <a:lnRef idx="2">
+            <a:schemeClr val="dk1"/>
+          </a:lnRef>
+          <a:fillRef idx="1">
+            <a:schemeClr val="lt1"/>
+          </a:fillRef>
+          <a:effectRef idx="0">
+            <a:schemeClr val="dk1"/>
+          </a:effectRef>
+          <a:fontRef idx="minor">
+            <a:schemeClr val="dk1"/>
+          </a:fontRef>
+        </p:style>
+      </p:cxnSp>
+      <p:sp>
+        <p:nvSpPr>
+          <p:cNvPr id="51" name="文本框 50">
+            <a:extLst>
+              <a:ext uri="{FF2B5EF4-FFF2-40B4-BE49-F238E27FC236}">
+                <a16:creationId xmlns:a16="http://schemas.microsoft.com/office/drawing/2014/main" id="{AD568948-2CC1-47FC-A785-8790A1227A54}"/>
+              </a:ext>
+            </a:extLst>
+          </p:cNvPr>
+          <p:cNvSpPr txBox="1"/>
+          <p:nvPr/>
+        </p:nvSpPr>
+        <p:spPr>
+          <a:xfrm>
+            <a:off x="1796176" y="3064138"/>
+            <a:ext cx="1032655" cy="369332"/>
+          </a:xfrm>
+          <a:prstGeom prst="rect">
+            <a:avLst/>
+          </a:prstGeom>
+          <a:noFill/>
+        </p:spPr>
+        <p:txBody>
+          <a:bodyPr wrap="none" rtlCol="0">
+            <a:spAutoFit/>
+          </a:bodyPr>
+          <a:lstStyle/>
+          <a:p>
+            <a:r>
+              <a:rPr lang="en-US" altLang="zh-CN" b="1" dirty="0"/>
+              <a:t>Server 2</a:t>
+            </a:r>
+            <a:endParaRPr lang="zh-CN" altLang="en-US" b="1" dirty="0"/>
+          </a:p>
+        </p:txBody>
+      </p:sp>
+      <p:sp>
+        <p:nvSpPr>
+          <p:cNvPr id="52" name="文本框 51">
+            <a:extLst>
+              <a:ext uri="{FF2B5EF4-FFF2-40B4-BE49-F238E27FC236}">
+                <a16:creationId xmlns:a16="http://schemas.microsoft.com/office/drawing/2014/main" id="{1725C1DA-833B-4D36-8140-A1257ECDC7F2}"/>
+              </a:ext>
+            </a:extLst>
+          </p:cNvPr>
+          <p:cNvSpPr txBox="1"/>
+          <p:nvPr/>
+        </p:nvSpPr>
+        <p:spPr>
+          <a:xfrm>
+            <a:off x="9491610" y="3077098"/>
+            <a:ext cx="1035861" cy="369332"/>
+          </a:xfrm>
+          <a:prstGeom prst="rect">
+            <a:avLst/>
+          </a:prstGeom>
+          <a:noFill/>
+        </p:spPr>
+        <p:txBody>
+          <a:bodyPr wrap="none" rtlCol="0">
+            <a:spAutoFit/>
+          </a:bodyPr>
+          <a:lstStyle/>
+          <a:p>
+            <a:r>
+              <a:rPr lang="en-US" altLang="zh-CN" b="1" dirty="0"/>
+              <a:t>Server 3</a:t>
+            </a:r>
+            <a:endParaRPr lang="zh-CN" altLang="en-US" b="1" dirty="0"/>
+          </a:p>
+        </p:txBody>
+      </p:sp>
+      <p:sp>
+        <p:nvSpPr>
+          <p:cNvPr id="81" name="文本框 80">
+            <a:extLst>
+              <a:ext uri="{FF2B5EF4-FFF2-40B4-BE49-F238E27FC236}">
+                <a16:creationId xmlns:a16="http://schemas.microsoft.com/office/drawing/2014/main" id="{28EA2CBF-093A-4909-8C28-BD9A3C3909F1}"/>
+              </a:ext>
+            </a:extLst>
+          </p:cNvPr>
+          <p:cNvSpPr txBox="1"/>
+          <p:nvPr/>
+        </p:nvSpPr>
+        <p:spPr>
+          <a:xfrm>
+            <a:off x="843185" y="5403761"/>
+            <a:ext cx="4360489" cy="369332"/>
+          </a:xfrm>
+          <a:prstGeom prst="rect">
+            <a:avLst/>
+          </a:prstGeom>
+          <a:noFill/>
+        </p:spPr>
+        <p:txBody>
+          <a:bodyPr wrap="none" rtlCol="0">
+            <a:spAutoFit/>
+          </a:bodyPr>
+          <a:lstStyle/>
+          <a:p>
+            <a:r>
+              <a:rPr lang="en-US" altLang="zh-CN" b="1" dirty="0">
+                <a:effectLst>
+                  <a:outerShdw blurRad="38100" dist="38100" dir="2700000" algn="tl">
+                    <a:srgbClr val="000000">
+                      <a:alpha val="43137"/>
+                    </a:srgbClr>
+                  </a:outerShdw>
+                </a:effectLst>
+              </a:rPr>
+              <a:t>Inbound traffic = </a:t>
+            </a:r>
+            <a:r>
+              <a:rPr lang="en-US" altLang="zh-CN" dirty="0"/>
+              <a:t>from ingress to website</a:t>
+            </a:r>
+          </a:p>
+        </p:txBody>
+      </p:sp>
+      <p:sp>
+        <p:nvSpPr>
+          <p:cNvPr id="68" name="矩形 67">
+            <a:extLst>
+              <a:ext uri="{FF2B5EF4-FFF2-40B4-BE49-F238E27FC236}">
+                <a16:creationId xmlns:a16="http://schemas.microsoft.com/office/drawing/2014/main" id="{A9D723AE-F706-4D7D-BBAB-E5C514EEE369}"/>
+              </a:ext>
+            </a:extLst>
+          </p:cNvPr>
+          <p:cNvSpPr/>
+          <p:nvPr/>
+        </p:nvSpPr>
+        <p:spPr>
+          <a:xfrm>
+            <a:off x="4586684" y="1454239"/>
+            <a:ext cx="1109803" cy="572726"/>
+          </a:xfrm>
+          <a:prstGeom prst="rect">
+            <a:avLst/>
+          </a:prstGeom>
+          <a:ln w="38100"/>
+        </p:spPr>
+        <p:style>
+          <a:lnRef idx="2">
+            <a:schemeClr val="dk1"/>
+          </a:lnRef>
+          <a:fillRef idx="1">
+            <a:schemeClr val="lt1"/>
+          </a:fillRef>
+          <a:effectRef idx="0">
+            <a:schemeClr val="dk1"/>
+          </a:effectRef>
+          <a:fontRef idx="minor">
+            <a:schemeClr val="dk1"/>
+          </a:fontRef>
+        </p:style>
+        <p:txBody>
+          <a:bodyPr rtlCol="0" anchor="ctr"/>
+          <a:lstStyle/>
+          <a:p>
+            <a:pPr algn="ctr"/>
+            <a:r>
+              <a:rPr lang="en-US" altLang="zh-CN" dirty="0"/>
+              <a:t>Website</a:t>
+            </a:r>
+          </a:p>
+          <a:p>
+            <a:pPr algn="ctr"/>
+            <a:r>
+              <a:rPr lang="en-US" altLang="zh-CN" dirty="0"/>
+              <a:t>Server 1</a:t>
+            </a:r>
+            <a:endParaRPr lang="zh-CN" altLang="en-US" dirty="0">
+              <a:solidFill>
+                <a:schemeClr val="dk1"/>
+              </a:solidFill>
+            </a:endParaRPr>
+          </a:p>
+        </p:txBody>
+      </p:sp>
+      <p:cxnSp>
+        <p:nvCxnSpPr>
+          <p:cNvPr id="70" name="直接连接符 69">
+            <a:extLst>
+              <a:ext uri="{FF2B5EF4-FFF2-40B4-BE49-F238E27FC236}">
+                <a16:creationId xmlns:a16="http://schemas.microsoft.com/office/drawing/2014/main" id="{A06FF2B9-AD85-4911-9880-4ED322D661A5}"/>
+              </a:ext>
+            </a:extLst>
+          </p:cNvPr>
+          <p:cNvCxnSpPr>
+            <a:cxnSpLocks/>
+            <a:stCxn id="5" idx="0"/>
+            <a:endCxn id="68" idx="2"/>
+          </p:cNvCxnSpPr>
+          <p:nvPr/>
+        </p:nvCxnSpPr>
+        <p:spPr>
+          <a:xfrm flipH="1" flipV="1">
+            <a:off x="5141586" y="2026965"/>
+            <a:ext cx="15836" cy="705496"/>
+          </a:xfrm>
+          <a:prstGeom prst="line">
+            <a:avLst/>
+          </a:prstGeom>
+          <a:ln w="38100"/>
+        </p:spPr>
+        <p:style>
+          <a:lnRef idx="2">
+            <a:schemeClr val="dk1"/>
+          </a:lnRef>
+          <a:fillRef idx="1">
+            <a:schemeClr val="lt1"/>
+          </a:fillRef>
+          <a:effectRef idx="0">
+            <a:schemeClr val="dk1"/>
+          </a:effectRef>
+          <a:fontRef idx="minor">
+            <a:schemeClr val="dk1"/>
+          </a:fontRef>
+        </p:style>
+      </p:cxnSp>
+      <p:sp>
+        <p:nvSpPr>
+          <p:cNvPr id="58" name="椭圆 57">
+            <a:extLst>
+              <a:ext uri="{FF2B5EF4-FFF2-40B4-BE49-F238E27FC236}">
+                <a16:creationId xmlns:a16="http://schemas.microsoft.com/office/drawing/2014/main" id="{4EF980F0-2B65-4A13-9CB4-9BE5E940FCFB}"/>
+              </a:ext>
+            </a:extLst>
+          </p:cNvPr>
+          <p:cNvSpPr/>
+          <p:nvPr/>
+        </p:nvSpPr>
+        <p:spPr>
+          <a:xfrm>
+            <a:off x="5780498" y="3941454"/>
+            <a:ext cx="834312" cy="818585"/>
+          </a:xfrm>
+          <a:prstGeom prst="ellipse">
+            <a:avLst/>
+          </a:prstGeom>
+          <a:ln w="38100"/>
+        </p:spPr>
+        <p:style>
+          <a:lnRef idx="2">
+            <a:schemeClr val="dk1"/>
+          </a:lnRef>
+          <a:fillRef idx="1">
+            <a:schemeClr val="lt1"/>
+          </a:fillRef>
+          <a:effectRef idx="0">
+            <a:schemeClr val="dk1"/>
+          </a:effectRef>
+          <a:fontRef idx="minor">
+            <a:schemeClr val="dk1"/>
+          </a:fontRef>
+        </p:style>
+        <p:txBody>
+          <a:bodyPr rtlCol="0" anchor="ctr"/>
+          <a:lstStyle/>
+          <a:p>
+            <a:pPr algn="ctr"/>
+            <a:r>
+              <a:rPr lang="en-US" altLang="zh-CN" dirty="0"/>
+              <a:t>P4</a:t>
+            </a:r>
+            <a:endParaRPr lang="zh-CN" altLang="en-US" dirty="0"/>
+          </a:p>
+        </p:txBody>
+      </p:sp>
+      <p:cxnSp>
+        <p:nvCxnSpPr>
+          <p:cNvPr id="60" name="直接连接符 59">
+            <a:extLst>
+              <a:ext uri="{FF2B5EF4-FFF2-40B4-BE49-F238E27FC236}">
+                <a16:creationId xmlns:a16="http://schemas.microsoft.com/office/drawing/2014/main" id="{07D16CBB-2386-4C62-AF91-FFF13C4CF2C8}"/>
+              </a:ext>
+            </a:extLst>
+          </p:cNvPr>
+          <p:cNvCxnSpPr>
+            <a:cxnSpLocks/>
+            <a:stCxn id="7" idx="4"/>
+            <a:endCxn id="58" idx="6"/>
+          </p:cNvCxnSpPr>
+          <p:nvPr/>
+        </p:nvCxnSpPr>
+        <p:spPr>
+          <a:xfrm flipH="1">
+            <a:off x="6614810" y="3551046"/>
+            <a:ext cx="532313" cy="799701"/>
+          </a:xfrm>
+          <a:prstGeom prst="line">
+            <a:avLst/>
+          </a:prstGeom>
+          <a:ln w="38100"/>
+        </p:spPr>
+        <p:style>
+          <a:lnRef idx="2">
+            <a:schemeClr val="dk1"/>
+          </a:lnRef>
+          <a:fillRef idx="1">
+            <a:schemeClr val="lt1"/>
+          </a:fillRef>
+          <a:effectRef idx="0">
+            <a:schemeClr val="dk1"/>
+          </a:effectRef>
+          <a:fontRef idx="minor">
+            <a:schemeClr val="dk1"/>
+          </a:fontRef>
+        </p:style>
+      </p:cxnSp>
+      <p:sp>
+        <p:nvSpPr>
+          <p:cNvPr id="73" name="爆炸形: 8 pt  72">
+            <a:extLst>
+              <a:ext uri="{FF2B5EF4-FFF2-40B4-BE49-F238E27FC236}">
+                <a16:creationId xmlns:a16="http://schemas.microsoft.com/office/drawing/2014/main" id="{939F9979-DA86-44B1-9958-5D63BCAAD896}"/>
+              </a:ext>
+            </a:extLst>
+          </p:cNvPr>
+          <p:cNvSpPr/>
+          <p:nvPr/>
+        </p:nvSpPr>
+        <p:spPr>
+          <a:xfrm>
+            <a:off x="6834012" y="3157784"/>
+            <a:ext cx="659876" cy="622169"/>
+          </a:xfrm>
+          <a:prstGeom prst="irregularSeal1">
+            <a:avLst/>
+          </a:prstGeom>
+          <a:solidFill>
+            <a:srgbClr val="FFC000"/>
+          </a:solidFill>
+        </p:spPr>
+        <p:style>
+          <a:lnRef idx="2">
+            <a:schemeClr val="accent1">
+              <a:shade val="50000"/>
+            </a:schemeClr>
+          </a:lnRef>
+          <a:fillRef idx="1">
+            <a:schemeClr val="accent1"/>
+          </a:fillRef>
+          <a:effectRef idx="0">
+            <a:schemeClr val="accent1"/>
+          </a:effectRef>
+          <a:fontRef idx="minor">
+            <a:schemeClr val="lt1"/>
+          </a:fontRef>
+        </p:style>
+        <p:txBody>
+          <a:bodyPr rtlCol="0" anchor="ctr"/>
+          <a:lstStyle/>
+          <a:p>
+            <a:pPr algn="ctr"/>
+            <a:endParaRPr lang="zh-CN" altLang="en-US"/>
+          </a:p>
+        </p:txBody>
+      </p:sp>
+      <p:sp>
+        <p:nvSpPr>
+          <p:cNvPr id="82" name="文本框 81">
+            <a:extLst>
+              <a:ext uri="{FF2B5EF4-FFF2-40B4-BE49-F238E27FC236}">
+                <a16:creationId xmlns:a16="http://schemas.microsoft.com/office/drawing/2014/main" id="{0086ED26-0CAF-4B09-8AF7-7C154F2D9678}"/>
+              </a:ext>
+            </a:extLst>
+          </p:cNvPr>
+          <p:cNvSpPr txBox="1"/>
+          <p:nvPr/>
+        </p:nvSpPr>
+        <p:spPr>
+          <a:xfrm>
+            <a:off x="5320474" y="4830630"/>
+            <a:ext cx="1632178" cy="369332"/>
+          </a:xfrm>
+          <a:prstGeom prst="rect">
+            <a:avLst/>
+          </a:prstGeom>
+          <a:noFill/>
+        </p:spPr>
+        <p:txBody>
+          <a:bodyPr wrap="none" rtlCol="0">
+            <a:spAutoFit/>
+          </a:bodyPr>
+          <a:lstStyle/>
+          <a:p>
+            <a:r>
+              <a:rPr lang="en-US" altLang="zh-CN" b="1" dirty="0">
+                <a:effectLst>
+                  <a:outerShdw blurRad="38100" dist="38100" dir="2700000" algn="tl">
+                    <a:srgbClr val="000000">
+                      <a:alpha val="43137"/>
+                    </a:srgbClr>
+                  </a:outerShdw>
+                </a:effectLst>
+              </a:rPr>
+              <a:t>DCN Gateway</a:t>
+            </a:r>
+            <a:endParaRPr lang="zh-CN" altLang="en-US" b="1" dirty="0">
+              <a:effectLst>
+                <a:outerShdw blurRad="38100" dist="38100" dir="2700000" algn="tl">
+                  <a:srgbClr val="000000">
+                    <a:alpha val="43137"/>
+                  </a:srgbClr>
+                </a:outerShdw>
+              </a:effectLst>
+            </a:endParaRPr>
+          </a:p>
+        </p:txBody>
+      </p:sp>
+      <p:cxnSp>
+        <p:nvCxnSpPr>
+          <p:cNvPr id="154" name="直接连接符 153">
+            <a:extLst>
+              <a:ext uri="{FF2B5EF4-FFF2-40B4-BE49-F238E27FC236}">
+                <a16:creationId xmlns:a16="http://schemas.microsoft.com/office/drawing/2014/main" id="{EB09FD00-4119-4321-8CE4-025E8E5B3021}"/>
+              </a:ext>
+            </a:extLst>
+          </p:cNvPr>
+          <p:cNvCxnSpPr>
+            <a:cxnSpLocks/>
+            <a:stCxn id="5" idx="2"/>
+            <a:endCxn id="167" idx="3"/>
+          </p:cNvCxnSpPr>
+          <p:nvPr/>
+        </p:nvCxnSpPr>
+        <p:spPr>
+          <a:xfrm flipH="1">
+            <a:off x="3756019" y="3141754"/>
+            <a:ext cx="984247" cy="75530"/>
+          </a:xfrm>
+          <a:prstGeom prst="line">
+            <a:avLst/>
+          </a:prstGeom>
+          <a:ln w="38100"/>
+        </p:spPr>
+        <p:style>
+          <a:lnRef idx="2">
+            <a:schemeClr val="dk1"/>
+          </a:lnRef>
+          <a:fillRef idx="1">
+            <a:schemeClr val="lt1"/>
+          </a:fillRef>
+          <a:effectRef idx="0">
+            <a:schemeClr val="dk1"/>
+          </a:effectRef>
+          <a:fontRef idx="minor">
+            <a:schemeClr val="dk1"/>
+          </a:fontRef>
+        </p:style>
+      </p:cxnSp>
+      <p:sp>
+        <p:nvSpPr>
+          <p:cNvPr id="167" name="矩形 166">
+            <a:extLst>
+              <a:ext uri="{FF2B5EF4-FFF2-40B4-BE49-F238E27FC236}">
+                <a16:creationId xmlns:a16="http://schemas.microsoft.com/office/drawing/2014/main" id="{0D3BD67B-3B9E-45B7-8322-AC576AFD746E}"/>
+              </a:ext>
+            </a:extLst>
+          </p:cNvPr>
+          <p:cNvSpPr/>
+          <p:nvPr/>
+        </p:nvSpPr>
+        <p:spPr>
+          <a:xfrm>
+            <a:off x="2934642" y="2989530"/>
+            <a:ext cx="821377" cy="455507"/>
+          </a:xfrm>
+          <a:prstGeom prst="rect">
+            <a:avLst/>
+          </a:prstGeom>
+          <a:ln w="38100"/>
+        </p:spPr>
+        <p:style>
+          <a:lnRef idx="2">
+            <a:schemeClr val="dk1"/>
+          </a:lnRef>
+          <a:fillRef idx="1">
+            <a:schemeClr val="lt1"/>
+          </a:fillRef>
+          <a:effectRef idx="0">
+            <a:schemeClr val="dk1"/>
+          </a:effectRef>
+          <a:fontRef idx="minor">
+            <a:schemeClr val="dk1"/>
+          </a:fontRef>
+        </p:style>
+        <p:txBody>
+          <a:bodyPr rtlCol="0" anchor="ctr"/>
+          <a:lstStyle/>
+          <a:p>
+            <a:pPr algn="ctr"/>
+            <a:r>
+              <a:rPr lang="en-US" altLang="zh-CN" dirty="0">
+                <a:solidFill>
+                  <a:schemeClr val="dk1"/>
+                </a:solidFill>
+              </a:rPr>
+              <a:t>Kernel</a:t>
+            </a:r>
+            <a:endParaRPr lang="zh-CN" altLang="en-US" dirty="0">
+              <a:solidFill>
+                <a:schemeClr val="dk1"/>
+              </a:solidFill>
+            </a:endParaRPr>
+          </a:p>
+        </p:txBody>
+      </p:sp>
+      <p:sp>
+        <p:nvSpPr>
+          <p:cNvPr id="169" name="矩形 168">
+            <a:extLst>
+              <a:ext uri="{FF2B5EF4-FFF2-40B4-BE49-F238E27FC236}">
+                <a16:creationId xmlns:a16="http://schemas.microsoft.com/office/drawing/2014/main" id="{A4239ED1-B7ED-47AE-A4C3-28FEA8C6F336}"/>
+              </a:ext>
+            </a:extLst>
+          </p:cNvPr>
+          <p:cNvSpPr/>
+          <p:nvPr/>
+        </p:nvSpPr>
+        <p:spPr>
+          <a:xfrm>
+            <a:off x="8462731" y="2995282"/>
+            <a:ext cx="821377" cy="455507"/>
+          </a:xfrm>
+          <a:prstGeom prst="rect">
+            <a:avLst/>
+          </a:prstGeom>
+          <a:ln w="38100"/>
+        </p:spPr>
+        <p:style>
+          <a:lnRef idx="2">
+            <a:schemeClr val="dk1"/>
+          </a:lnRef>
+          <a:fillRef idx="1">
+            <a:schemeClr val="lt1"/>
+          </a:fillRef>
+          <a:effectRef idx="0">
+            <a:schemeClr val="dk1"/>
+          </a:effectRef>
+          <a:fontRef idx="minor">
+            <a:schemeClr val="dk1"/>
+          </a:fontRef>
+        </p:style>
+        <p:txBody>
+          <a:bodyPr rtlCol="0" anchor="ctr"/>
+          <a:lstStyle/>
+          <a:p>
+            <a:pPr algn="ctr"/>
+            <a:r>
+              <a:rPr lang="en-US" altLang="zh-CN" dirty="0">
+                <a:solidFill>
+                  <a:schemeClr val="dk1"/>
+                </a:solidFill>
+              </a:rPr>
+              <a:t>Kernel</a:t>
+            </a:r>
+            <a:endParaRPr lang="zh-CN" altLang="en-US" dirty="0">
+              <a:solidFill>
+                <a:schemeClr val="dk1"/>
+              </a:solidFill>
+            </a:endParaRPr>
+          </a:p>
+        </p:txBody>
+      </p:sp>
+      <p:cxnSp>
+        <p:nvCxnSpPr>
+          <p:cNvPr id="172" name="直接连接符 171">
+            <a:extLst>
+              <a:ext uri="{FF2B5EF4-FFF2-40B4-BE49-F238E27FC236}">
+                <a16:creationId xmlns:a16="http://schemas.microsoft.com/office/drawing/2014/main" id="{958B7BBD-68EA-490E-B5AC-1C496A51A466}"/>
+              </a:ext>
+            </a:extLst>
+          </p:cNvPr>
+          <p:cNvCxnSpPr>
+            <a:cxnSpLocks/>
+            <a:stCxn id="26" idx="1"/>
+            <a:endCxn id="7" idx="6"/>
+          </p:cNvCxnSpPr>
+          <p:nvPr/>
+        </p:nvCxnSpPr>
+        <p:spPr>
+          <a:xfrm flipH="1">
+            <a:off x="7564279" y="2677674"/>
+            <a:ext cx="898452" cy="464080"/>
+          </a:xfrm>
+          <a:prstGeom prst="line">
+            <a:avLst/>
+          </a:prstGeom>
+          <a:ln w="38100"/>
+        </p:spPr>
+        <p:style>
+          <a:lnRef idx="2">
+            <a:schemeClr val="dk1"/>
+          </a:lnRef>
+          <a:fillRef idx="1">
+            <a:schemeClr val="lt1"/>
+          </a:fillRef>
+          <a:effectRef idx="0">
+            <a:schemeClr val="dk1"/>
+          </a:effectRef>
+          <a:fontRef idx="minor">
+            <a:schemeClr val="dk1"/>
+          </a:fontRef>
+        </p:style>
+      </p:cxnSp>
+      <p:cxnSp>
+        <p:nvCxnSpPr>
+          <p:cNvPr id="175" name="直接连接符 174">
+            <a:extLst>
+              <a:ext uri="{FF2B5EF4-FFF2-40B4-BE49-F238E27FC236}">
+                <a16:creationId xmlns:a16="http://schemas.microsoft.com/office/drawing/2014/main" id="{10588AFB-54C5-4CED-B43F-31912960F893}"/>
+              </a:ext>
+            </a:extLst>
+          </p:cNvPr>
+          <p:cNvCxnSpPr>
+            <a:cxnSpLocks/>
+            <a:stCxn id="169" idx="1"/>
+            <a:endCxn id="7" idx="6"/>
+          </p:cNvCxnSpPr>
+          <p:nvPr/>
+        </p:nvCxnSpPr>
+        <p:spPr>
+          <a:xfrm flipH="1" flipV="1">
+            <a:off x="7564279" y="3141754"/>
+            <a:ext cx="898452" cy="81282"/>
+          </a:xfrm>
+          <a:prstGeom prst="line">
+            <a:avLst/>
+          </a:prstGeom>
+          <a:ln w="38100"/>
+        </p:spPr>
+        <p:style>
+          <a:lnRef idx="2">
+            <a:schemeClr val="dk1"/>
+          </a:lnRef>
+          <a:fillRef idx="1">
+            <a:schemeClr val="lt1"/>
+          </a:fillRef>
+          <a:effectRef idx="0">
+            <a:schemeClr val="dk1"/>
+          </a:effectRef>
+          <a:fontRef idx="minor">
+            <a:schemeClr val="dk1"/>
+          </a:fontRef>
+        </p:style>
+      </p:cxnSp>
+      <p:grpSp>
+        <p:nvGrpSpPr>
+          <p:cNvPr id="4" name="组合 3">
+            <a:extLst>
+              <a:ext uri="{FF2B5EF4-FFF2-40B4-BE49-F238E27FC236}">
+                <a16:creationId xmlns:a16="http://schemas.microsoft.com/office/drawing/2014/main" id="{051D2A1B-0FFA-4258-9673-500956A25DB9}"/>
+              </a:ext>
+            </a:extLst>
+          </p:cNvPr>
+          <p:cNvGrpSpPr/>
+          <p:nvPr/>
+        </p:nvGrpSpPr>
+        <p:grpSpPr>
+          <a:xfrm>
+            <a:off x="7272978" y="814066"/>
+            <a:ext cx="2081717" cy="633884"/>
+            <a:chOff x="9569231" y="6032204"/>
+            <a:chExt cx="2081717" cy="633884"/>
+          </a:xfrm>
+        </p:grpSpPr>
+        <p:sp>
+          <p:nvSpPr>
+            <p:cNvPr id="118" name="矩形: 圆角 117">
+              <a:extLst>
+                <a:ext uri="{FF2B5EF4-FFF2-40B4-BE49-F238E27FC236}">
+                  <a16:creationId xmlns:a16="http://schemas.microsoft.com/office/drawing/2014/main" id="{2721806F-28BF-40E5-AEA7-4C2277077CF3}"/>
+                </a:ext>
+              </a:extLst>
+            </p:cNvPr>
+            <p:cNvSpPr/>
+            <p:nvPr/>
+          </p:nvSpPr>
+          <p:spPr>
+            <a:xfrm>
+              <a:off x="9569231" y="6032204"/>
+              <a:ext cx="2081717" cy="633884"/>
+            </a:xfrm>
+            <a:prstGeom prst="roundRect">
+              <a:avLst/>
+            </a:prstGeom>
+          </p:spPr>
+          <p:style>
+            <a:lnRef idx="1">
+              <a:schemeClr val="accent3"/>
+            </a:lnRef>
+            <a:fillRef idx="2">
+              <a:schemeClr val="accent3"/>
+            </a:fillRef>
+            <a:effectRef idx="1">
+              <a:schemeClr val="accent3"/>
+            </a:effectRef>
+            <a:fontRef idx="minor">
+              <a:schemeClr val="dk1"/>
+            </a:fontRef>
+          </p:style>
+          <p:txBody>
+            <a:bodyPr rtlCol="0" anchor="ctr"/>
+            <a:lstStyle/>
+            <a:p>
+              <a:pPr algn="ctr"/>
+              <a:endParaRPr lang="zh-CN" altLang="en-US" dirty="0"/>
+            </a:p>
+          </p:txBody>
+        </p:sp>
+        <p:sp>
+          <p:nvSpPr>
+            <p:cNvPr id="123" name="文本框 122">
+              <a:extLst>
+                <a:ext uri="{FF2B5EF4-FFF2-40B4-BE49-F238E27FC236}">
+                  <a16:creationId xmlns:a16="http://schemas.microsoft.com/office/drawing/2014/main" id="{5CA18FD1-C371-40CC-86C5-C9D31691ED9B}"/>
+                </a:ext>
+              </a:extLst>
+            </p:cNvPr>
+            <p:cNvSpPr txBox="1"/>
+            <p:nvPr/>
+          </p:nvSpPr>
+          <p:spPr>
+            <a:xfrm>
+              <a:off x="10957260" y="6296756"/>
+              <a:ext cx="675185" cy="369332"/>
+            </a:xfrm>
+            <a:prstGeom prst="rect">
+              <a:avLst/>
+            </a:prstGeom>
+            <a:noFill/>
+          </p:spPr>
+          <p:txBody>
+            <a:bodyPr wrap="none" rtlCol="0">
+              <a:spAutoFit/>
+            </a:bodyPr>
+            <a:lstStyle/>
+            <a:p>
+              <a:r>
+                <a:rPr lang="en-US" altLang="zh-CN" b="1" dirty="0"/>
+                <a:t>Host</a:t>
+              </a:r>
+              <a:endParaRPr lang="zh-CN" altLang="en-US" b="1" dirty="0"/>
+            </a:p>
+          </p:txBody>
+        </p:sp>
+        <p:sp>
+          <p:nvSpPr>
+            <p:cNvPr id="183" name="矩形 182">
+              <a:extLst>
+                <a:ext uri="{FF2B5EF4-FFF2-40B4-BE49-F238E27FC236}">
+                  <a16:creationId xmlns:a16="http://schemas.microsoft.com/office/drawing/2014/main" id="{3200D977-FC08-41E2-93A1-C71D90B8945B}"/>
+                </a:ext>
+              </a:extLst>
+            </p:cNvPr>
+            <p:cNvSpPr/>
+            <p:nvPr/>
+          </p:nvSpPr>
+          <p:spPr>
+            <a:xfrm>
+              <a:off x="9623819" y="6150970"/>
+              <a:ext cx="821377" cy="455507"/>
+            </a:xfrm>
+            <a:prstGeom prst="rect">
+              <a:avLst/>
+            </a:prstGeom>
+            <a:ln w="38100"/>
+          </p:spPr>
+          <p:style>
+            <a:lnRef idx="2">
+              <a:schemeClr val="dk1"/>
+            </a:lnRef>
+            <a:fillRef idx="1">
+              <a:schemeClr val="lt1"/>
+            </a:fillRef>
+            <a:effectRef idx="0">
+              <a:schemeClr val="dk1"/>
+            </a:effectRef>
+            <a:fontRef idx="minor">
+              <a:schemeClr val="dk1"/>
+            </a:fontRef>
+          </p:style>
+          <p:txBody>
+            <a:bodyPr rtlCol="0" anchor="ctr"/>
+            <a:lstStyle/>
+            <a:p>
+              <a:pPr algn="ctr"/>
+              <a:r>
+                <a:rPr lang="en-US" altLang="zh-CN" dirty="0">
+                  <a:solidFill>
+                    <a:schemeClr val="dk1"/>
+                  </a:solidFill>
+                </a:rPr>
+                <a:t>SAM</a:t>
+              </a:r>
+              <a:endParaRPr lang="zh-CN" altLang="en-US" dirty="0">
+                <a:solidFill>
+                  <a:schemeClr val="dk1"/>
+                </a:solidFill>
+              </a:endParaRPr>
+            </a:p>
+          </p:txBody>
+        </p:sp>
+      </p:grpSp>
+      <p:cxnSp>
+        <p:nvCxnSpPr>
+          <p:cNvPr id="84" name="直接连接符 83">
+            <a:extLst>
+              <a:ext uri="{FF2B5EF4-FFF2-40B4-BE49-F238E27FC236}">
+                <a16:creationId xmlns:a16="http://schemas.microsoft.com/office/drawing/2014/main" id="{16562D5F-42E2-45A5-8E27-F9C92B51CC01}"/>
+              </a:ext>
+            </a:extLst>
+          </p:cNvPr>
+          <p:cNvCxnSpPr>
+            <a:cxnSpLocks/>
+            <a:stCxn id="92" idx="2"/>
+            <a:endCxn id="7" idx="0"/>
+          </p:cNvCxnSpPr>
+          <p:nvPr/>
+        </p:nvCxnSpPr>
+        <p:spPr>
+          <a:xfrm>
+            <a:off x="6423778" y="1322533"/>
+            <a:ext cx="723345" cy="1409928"/>
+          </a:xfrm>
+          <a:prstGeom prst="line">
+            <a:avLst/>
+          </a:prstGeom>
+          <a:ln w="12700">
+            <a:prstDash val="sysDash"/>
+          </a:ln>
+        </p:spPr>
+        <p:style>
+          <a:lnRef idx="2">
+            <a:schemeClr val="dk1"/>
+          </a:lnRef>
+          <a:fillRef idx="1">
+            <a:schemeClr val="lt1"/>
+          </a:fillRef>
+          <a:effectRef idx="0">
+            <a:schemeClr val="dk1"/>
+          </a:effectRef>
+          <a:fontRef idx="minor">
+            <a:schemeClr val="dk1"/>
+          </a:fontRef>
+        </p:style>
+      </p:cxnSp>
+      <p:cxnSp>
+        <p:nvCxnSpPr>
+          <p:cNvPr id="85" name="直接连接符 84">
+            <a:extLst>
+              <a:ext uri="{FF2B5EF4-FFF2-40B4-BE49-F238E27FC236}">
+                <a16:creationId xmlns:a16="http://schemas.microsoft.com/office/drawing/2014/main" id="{E7C69419-175F-497E-B979-86353FB1A505}"/>
+              </a:ext>
+            </a:extLst>
+          </p:cNvPr>
+          <p:cNvCxnSpPr>
+            <a:cxnSpLocks/>
+            <a:stCxn id="92" idx="2"/>
+            <a:endCxn id="58" idx="0"/>
+          </p:cNvCxnSpPr>
+          <p:nvPr/>
+        </p:nvCxnSpPr>
+        <p:spPr>
+          <a:xfrm flipH="1">
+            <a:off x="6197654" y="1322533"/>
+            <a:ext cx="226124" cy="2618921"/>
+          </a:xfrm>
+          <a:prstGeom prst="line">
+            <a:avLst/>
+          </a:prstGeom>
+          <a:ln w="12700">
+            <a:prstDash val="sysDash"/>
+          </a:ln>
+        </p:spPr>
+        <p:style>
+          <a:lnRef idx="2">
+            <a:schemeClr val="dk1"/>
+          </a:lnRef>
+          <a:fillRef idx="1">
+            <a:schemeClr val="lt1"/>
+          </a:fillRef>
+          <a:effectRef idx="0">
+            <a:schemeClr val="dk1"/>
+          </a:effectRef>
+          <a:fontRef idx="minor">
+            <a:schemeClr val="dk1"/>
+          </a:fontRef>
+        </p:style>
+      </p:cxnSp>
+      <p:cxnSp>
+        <p:nvCxnSpPr>
+          <p:cNvPr id="86" name="直接连接符 85">
+            <a:extLst>
+              <a:ext uri="{FF2B5EF4-FFF2-40B4-BE49-F238E27FC236}">
+                <a16:creationId xmlns:a16="http://schemas.microsoft.com/office/drawing/2014/main" id="{AF0C5777-2B8A-4135-A7BD-A238071AB07D}"/>
+              </a:ext>
+            </a:extLst>
+          </p:cNvPr>
+          <p:cNvCxnSpPr>
+            <a:cxnSpLocks/>
+            <a:stCxn id="92" idx="2"/>
+            <a:endCxn id="5" idx="7"/>
+          </p:cNvCxnSpPr>
+          <p:nvPr/>
+        </p:nvCxnSpPr>
+        <p:spPr>
+          <a:xfrm flipH="1">
+            <a:off x="5452396" y="1322533"/>
+            <a:ext cx="971382" cy="1529807"/>
+          </a:xfrm>
+          <a:prstGeom prst="line">
+            <a:avLst/>
+          </a:prstGeom>
+          <a:ln w="12700">
+            <a:prstDash val="sysDash"/>
+          </a:ln>
+        </p:spPr>
+        <p:style>
+          <a:lnRef idx="2">
+            <a:schemeClr val="dk1"/>
+          </a:lnRef>
+          <a:fillRef idx="1">
+            <a:schemeClr val="lt1"/>
+          </a:fillRef>
+          <a:effectRef idx="0">
+            <a:schemeClr val="dk1"/>
+          </a:effectRef>
+          <a:fontRef idx="minor">
+            <a:schemeClr val="dk1"/>
+          </a:fontRef>
+        </p:style>
+      </p:cxnSp>
+      <p:sp>
+        <p:nvSpPr>
+          <p:cNvPr id="92" name="文本框 91">
+            <a:extLst>
+              <a:ext uri="{FF2B5EF4-FFF2-40B4-BE49-F238E27FC236}">
+                <a16:creationId xmlns:a16="http://schemas.microsoft.com/office/drawing/2014/main" id="{FC9A054E-5899-4BE5-848E-1C72DF299908}"/>
+              </a:ext>
+            </a:extLst>
+          </p:cNvPr>
+          <p:cNvSpPr txBox="1"/>
+          <p:nvPr/>
+        </p:nvSpPr>
+        <p:spPr>
+          <a:xfrm>
+            <a:off x="5894904" y="953201"/>
+            <a:ext cx="1057748" cy="369332"/>
+          </a:xfrm>
+          <a:prstGeom prst="rect">
+            <a:avLst/>
+          </a:prstGeom>
+        </p:spPr>
+        <p:style>
+          <a:lnRef idx="2">
+            <a:schemeClr val="accent2">
+              <a:shade val="50000"/>
+            </a:schemeClr>
+          </a:lnRef>
+          <a:fillRef idx="1">
+            <a:schemeClr val="accent2"/>
+          </a:fillRef>
+          <a:effectRef idx="0">
+            <a:schemeClr val="accent2"/>
+          </a:effectRef>
+          <a:fontRef idx="minor">
+            <a:schemeClr val="lt1"/>
+          </a:fontRef>
+        </p:style>
+        <p:txBody>
+          <a:bodyPr wrap="square" rtlCol="0">
+            <a:spAutoFit/>
+          </a:bodyPr>
+          <a:lstStyle/>
+          <a:p>
+            <a:r>
+              <a:rPr lang="en-US" altLang="zh-CN" b="1" dirty="0"/>
+              <a:t>switch</a:t>
+            </a:r>
+            <a:endParaRPr lang="zh-CN" altLang="en-US" b="1" dirty="0"/>
+          </a:p>
+        </p:txBody>
+      </p:sp>
+      <p:cxnSp>
+        <p:nvCxnSpPr>
+          <p:cNvPr id="102" name="直接连接符 101">
+            <a:extLst>
+              <a:ext uri="{FF2B5EF4-FFF2-40B4-BE49-F238E27FC236}">
+                <a16:creationId xmlns:a16="http://schemas.microsoft.com/office/drawing/2014/main" id="{7E0E08E4-6849-4662-9E6D-662775DA1DC5}"/>
+              </a:ext>
+            </a:extLst>
+          </p:cNvPr>
+          <p:cNvCxnSpPr>
+            <a:cxnSpLocks/>
+            <a:stCxn id="118" idx="1"/>
+            <a:endCxn id="92" idx="3"/>
+          </p:cNvCxnSpPr>
+          <p:nvPr/>
+        </p:nvCxnSpPr>
+        <p:spPr>
+          <a:xfrm flipH="1">
+            <a:off x="6952652" y="1131008"/>
+            <a:ext cx="320326" cy="6859"/>
+          </a:xfrm>
+          <a:prstGeom prst="line">
+            <a:avLst/>
+          </a:prstGeom>
+          <a:ln w="38100"/>
+        </p:spPr>
+        <p:style>
+          <a:lnRef idx="2">
+            <a:schemeClr val="dk1"/>
+          </a:lnRef>
+          <a:fillRef idx="1">
+            <a:schemeClr val="lt1"/>
+          </a:fillRef>
+          <a:effectRef idx="0">
+            <a:schemeClr val="dk1"/>
+          </a:effectRef>
+          <a:fontRef idx="minor">
+            <a:schemeClr val="dk1"/>
+          </a:fontRef>
+        </p:style>
+      </p:cxnSp>
+      <p:sp>
+        <p:nvSpPr>
+          <p:cNvPr id="98" name="矩形 97">
+            <a:extLst>
+              <a:ext uri="{FF2B5EF4-FFF2-40B4-BE49-F238E27FC236}">
+                <a16:creationId xmlns:a16="http://schemas.microsoft.com/office/drawing/2014/main" id="{81909ED2-6B79-498A-8BCB-C30DD2FCEAD7}"/>
+              </a:ext>
+            </a:extLst>
+          </p:cNvPr>
+          <p:cNvSpPr/>
+          <p:nvPr/>
+        </p:nvSpPr>
+        <p:spPr>
+          <a:xfrm>
+            <a:off x="4428172" y="2500079"/>
+            <a:ext cx="764438" cy="455507"/>
+          </a:xfrm>
+          <a:prstGeom prst="rect">
+            <a:avLst/>
+          </a:prstGeom>
+          <a:ln w="38100"/>
+        </p:spPr>
+        <p:style>
+          <a:lnRef idx="2">
+            <a:schemeClr val="dk1"/>
+          </a:lnRef>
+          <a:fillRef idx="1">
+            <a:schemeClr val="lt1"/>
+          </a:fillRef>
+          <a:effectRef idx="0">
+            <a:schemeClr val="dk1"/>
+          </a:effectRef>
+          <a:fontRef idx="minor">
+            <a:schemeClr val="dk1"/>
+          </a:fontRef>
+        </p:style>
+        <p:txBody>
+          <a:bodyPr rtlCol="0" anchor="ctr"/>
+          <a:lstStyle/>
+          <a:p>
+            <a:pPr algn="ctr"/>
+            <a:r>
+              <a:rPr lang="en-US" altLang="zh-CN" dirty="0">
+                <a:solidFill>
+                  <a:schemeClr val="dk1"/>
+                </a:solidFill>
+              </a:rPr>
+              <a:t>NF1</a:t>
+            </a:r>
+            <a:endParaRPr lang="zh-CN" altLang="en-US" dirty="0">
+              <a:solidFill>
+                <a:schemeClr val="dk1"/>
+              </a:solidFill>
+            </a:endParaRPr>
+          </a:p>
+        </p:txBody>
+      </p:sp>
+    </p:spTree>
+    <p:extLst>
+      <p:ext uri="{BB962C8B-B14F-4D97-AF65-F5344CB8AC3E}">
+        <p14:creationId xmlns:p14="http://schemas.microsoft.com/office/powerpoint/2010/main" val="753456139"/>
       </p:ext>
     </p:extLst>
   </p:cSld>

</xml_diff>

<commit_message>
add UFRR, NotVia app; add UFRR and NotVia with Remapping test
</commit_message>
<xml_diff>
--- a/doc/SoftwareDesign/Architecture-P4.pptx
+++ b/doc/SoftwareDesign/Architecture-P4.pptx
@@ -202,7 +202,7 @@
           <a:p>
             <a:fld id="{B81778B8-8763-4D18-BF72-76154464FFE0}" type="datetimeFigureOut">
               <a:rPr lang="zh-CN" altLang="en-US" smtClean="0"/>
-              <a:t>2020/8/3</a:t>
+              <a:t>2020/8/21</a:t>
             </a:fld>
             <a:endParaRPr lang="zh-CN" altLang="en-US"/>
           </a:p>
@@ -2957,7 +2957,7 @@
           <a:p>
             <a:fld id="{6BBD34C2-3600-48BE-9702-B8B5DAB8968A}" type="datetimeFigureOut">
               <a:rPr lang="zh-CN" altLang="en-US" smtClean="0"/>
-              <a:t>2020/8/3</a:t>
+              <a:t>2020/8/21</a:t>
             </a:fld>
             <a:endParaRPr lang="zh-CN" altLang="en-US"/>
           </a:p>
@@ -3155,7 +3155,7 @@
           <a:p>
             <a:fld id="{6BBD34C2-3600-48BE-9702-B8B5DAB8968A}" type="datetimeFigureOut">
               <a:rPr lang="zh-CN" altLang="en-US" smtClean="0"/>
-              <a:t>2020/8/3</a:t>
+              <a:t>2020/8/21</a:t>
             </a:fld>
             <a:endParaRPr lang="zh-CN" altLang="en-US"/>
           </a:p>
@@ -3363,7 +3363,7 @@
           <a:p>
             <a:fld id="{6BBD34C2-3600-48BE-9702-B8B5DAB8968A}" type="datetimeFigureOut">
               <a:rPr lang="zh-CN" altLang="en-US" smtClean="0"/>
-              <a:t>2020/8/3</a:t>
+              <a:t>2020/8/21</a:t>
             </a:fld>
             <a:endParaRPr lang="zh-CN" altLang="en-US"/>
           </a:p>
@@ -3561,7 +3561,7 @@
           <a:p>
             <a:fld id="{6BBD34C2-3600-48BE-9702-B8B5DAB8968A}" type="datetimeFigureOut">
               <a:rPr lang="zh-CN" altLang="en-US" smtClean="0"/>
-              <a:t>2020/8/3</a:t>
+              <a:t>2020/8/21</a:t>
             </a:fld>
             <a:endParaRPr lang="zh-CN" altLang="en-US"/>
           </a:p>
@@ -3836,7 +3836,7 @@
           <a:p>
             <a:fld id="{6BBD34C2-3600-48BE-9702-B8B5DAB8968A}" type="datetimeFigureOut">
               <a:rPr lang="zh-CN" altLang="en-US" smtClean="0"/>
-              <a:t>2020/8/3</a:t>
+              <a:t>2020/8/21</a:t>
             </a:fld>
             <a:endParaRPr lang="zh-CN" altLang="en-US"/>
           </a:p>
@@ -4101,7 +4101,7 @@
           <a:p>
             <a:fld id="{6BBD34C2-3600-48BE-9702-B8B5DAB8968A}" type="datetimeFigureOut">
               <a:rPr lang="zh-CN" altLang="en-US" smtClean="0"/>
-              <a:t>2020/8/3</a:t>
+              <a:t>2020/8/21</a:t>
             </a:fld>
             <a:endParaRPr lang="zh-CN" altLang="en-US"/>
           </a:p>
@@ -4513,7 +4513,7 @@
           <a:p>
             <a:fld id="{6BBD34C2-3600-48BE-9702-B8B5DAB8968A}" type="datetimeFigureOut">
               <a:rPr lang="zh-CN" altLang="en-US" smtClean="0"/>
-              <a:t>2020/8/3</a:t>
+              <a:t>2020/8/21</a:t>
             </a:fld>
             <a:endParaRPr lang="zh-CN" altLang="en-US"/>
           </a:p>
@@ -4654,7 +4654,7 @@
           <a:p>
             <a:fld id="{6BBD34C2-3600-48BE-9702-B8B5DAB8968A}" type="datetimeFigureOut">
               <a:rPr lang="zh-CN" altLang="en-US" smtClean="0"/>
-              <a:t>2020/8/3</a:t>
+              <a:t>2020/8/21</a:t>
             </a:fld>
             <a:endParaRPr lang="zh-CN" altLang="en-US"/>
           </a:p>
@@ -4767,7 +4767,7 @@
           <a:p>
             <a:fld id="{6BBD34C2-3600-48BE-9702-B8B5DAB8968A}" type="datetimeFigureOut">
               <a:rPr lang="zh-CN" altLang="en-US" smtClean="0"/>
-              <a:t>2020/8/3</a:t>
+              <a:t>2020/8/21</a:t>
             </a:fld>
             <a:endParaRPr lang="zh-CN" altLang="en-US"/>
           </a:p>
@@ -5078,7 +5078,7 @@
           <a:p>
             <a:fld id="{6BBD34C2-3600-48BE-9702-B8B5DAB8968A}" type="datetimeFigureOut">
               <a:rPr lang="zh-CN" altLang="en-US" smtClean="0"/>
-              <a:t>2020/8/3</a:t>
+              <a:t>2020/8/21</a:t>
             </a:fld>
             <a:endParaRPr lang="zh-CN" altLang="en-US"/>
           </a:p>
@@ -5366,7 +5366,7 @@
           <a:p>
             <a:fld id="{6BBD34C2-3600-48BE-9702-B8B5DAB8968A}" type="datetimeFigureOut">
               <a:rPr lang="zh-CN" altLang="en-US" smtClean="0"/>
-              <a:t>2020/8/3</a:t>
+              <a:t>2020/8/21</a:t>
             </a:fld>
             <a:endParaRPr lang="zh-CN" altLang="en-US"/>
           </a:p>
@@ -5607,7 +5607,7 @@
           <a:p>
             <a:fld id="{6BBD34C2-3600-48BE-9702-B8B5DAB8968A}" type="datetimeFigureOut">
               <a:rPr lang="zh-CN" altLang="en-US" smtClean="0"/>
-              <a:t>2020/8/3</a:t>
+              <a:t>2020/8/21</a:t>
             </a:fld>
             <a:endParaRPr lang="zh-CN" altLang="en-US"/>
           </a:p>
@@ -6893,56 +6893,6 @@
       </p:cxnSp>
       <p:sp>
         <p:nvSpPr>
-          <p:cNvPr id="61" name="矩形: 圆角 60">
-            <a:extLst>
-              <a:ext uri="{FF2B5EF4-FFF2-40B4-BE49-F238E27FC236}">
-                <a16:creationId xmlns:a16="http://schemas.microsoft.com/office/drawing/2014/main" id="{A7B3F63E-C11E-4F1C-BDEC-D1C642EC4D3B}"/>
-              </a:ext>
-            </a:extLst>
-          </p:cNvPr>
-          <p:cNvSpPr/>
-          <p:nvPr/>
-        </p:nvSpPr>
-        <p:spPr>
-          <a:xfrm>
-            <a:off x="5591138" y="2959578"/>
-            <a:ext cx="1702765" cy="639960"/>
-          </a:xfrm>
-          <a:prstGeom prst="roundRect">
-            <a:avLst/>
-          </a:prstGeom>
-        </p:spPr>
-        <p:style>
-          <a:lnRef idx="2">
-            <a:schemeClr val="accent4">
-              <a:shade val="50000"/>
-            </a:schemeClr>
-          </a:lnRef>
-          <a:fillRef idx="1">
-            <a:schemeClr val="accent4"/>
-          </a:fillRef>
-          <a:effectRef idx="0">
-            <a:schemeClr val="accent4"/>
-          </a:effectRef>
-          <a:fontRef idx="minor">
-            <a:schemeClr val="lt1"/>
-          </a:fontRef>
-        </p:style>
-        <p:txBody>
-          <a:bodyPr rtlCol="0" anchor="ctr"/>
-          <a:lstStyle/>
-          <a:p>
-            <a:pPr algn="ctr"/>
-            <a:r>
-              <a:rPr lang="en-US" altLang="zh-CN" dirty="0"/>
-              <a:t>RabbitMQ</a:t>
-            </a:r>
-            <a:endParaRPr lang="zh-CN" altLang="en-US" dirty="0"/>
-          </a:p>
-        </p:txBody>
-      </p:sp>
-      <p:sp>
-        <p:nvSpPr>
           <p:cNvPr id="72" name="圆柱体 71">
             <a:extLst>
               <a:ext uri="{FF2B5EF4-FFF2-40B4-BE49-F238E27FC236}">
@@ -7080,55 +7030,6 @@
           </a:p>
         </p:txBody>
       </p:sp>
-      <p:cxnSp>
-        <p:nvCxnSpPr>
-          <p:cNvPr id="88" name="直接箭头连接符 87">
-            <a:extLst>
-              <a:ext uri="{FF2B5EF4-FFF2-40B4-BE49-F238E27FC236}">
-                <a16:creationId xmlns:a16="http://schemas.microsoft.com/office/drawing/2014/main" id="{2FA23CB9-52F9-4820-84D7-2A04B4C13603}"/>
-              </a:ext>
-            </a:extLst>
-          </p:cNvPr>
-          <p:cNvCxnSpPr>
-            <a:cxnSpLocks/>
-            <a:stCxn id="60" idx="0"/>
-            <a:endCxn id="61" idx="2"/>
-          </p:cNvCxnSpPr>
-          <p:nvPr/>
-        </p:nvCxnSpPr>
-        <p:spPr>
-          <a:xfrm flipV="1">
-            <a:off x="4663051" y="3599538"/>
-            <a:ext cx="1779470" cy="149491"/>
-          </a:xfrm>
-          <a:prstGeom prst="straightConnector1">
-            <a:avLst/>
-          </a:prstGeom>
-          <a:ln w="9525" cap="flat" cmpd="sng" algn="ctr">
-            <a:solidFill>
-              <a:schemeClr val="accent1"/>
-            </a:solidFill>
-            <a:prstDash val="dash"/>
-            <a:round/>
-            <a:headEnd type="none" w="med" len="med"/>
-            <a:tailEnd type="none" w="med" len="med"/>
-          </a:ln>
-        </p:spPr>
-        <p:style>
-          <a:lnRef idx="0">
-            <a:scrgbClr r="0" g="0" b="0"/>
-          </a:lnRef>
-          <a:fillRef idx="0">
-            <a:scrgbClr r="0" g="0" b="0"/>
-          </a:fillRef>
-          <a:effectRef idx="0">
-            <a:scrgbClr r="0" g="0" b="0"/>
-          </a:effectRef>
-          <a:fontRef idx="minor">
-            <a:schemeClr val="tx1"/>
-          </a:fontRef>
-        </p:style>
-      </p:cxnSp>
       <p:cxnSp>
         <p:nvCxnSpPr>
           <p:cNvPr id="142" name="直接箭头连接符 141">
@@ -7272,14 +7173,14 @@
           <p:cNvCxnSpPr>
             <a:cxnSpLocks/>
             <a:stCxn id="203" idx="1"/>
-            <a:endCxn id="61" idx="3"/>
+            <a:endCxn id="57" idx="3"/>
           </p:cNvCxnSpPr>
           <p:nvPr/>
         </p:nvCxnSpPr>
         <p:spPr>
-          <a:xfrm flipH="1">
-            <a:off x="7293903" y="3273061"/>
-            <a:ext cx="1910316" cy="6497"/>
+          <a:xfrm flipH="1" flipV="1">
+            <a:off x="7102844" y="3256978"/>
+            <a:ext cx="2101375" cy="16083"/>
           </a:xfrm>
           <a:prstGeom prst="straightConnector1">
             <a:avLst/>
@@ -7421,14 +7322,14 @@
           <p:cNvCxnSpPr>
             <a:cxnSpLocks/>
             <a:stCxn id="3" idx="2"/>
-            <a:endCxn id="61" idx="0"/>
+            <a:endCxn id="57" idx="0"/>
           </p:cNvCxnSpPr>
           <p:nvPr/>
         </p:nvCxnSpPr>
         <p:spPr>
           <a:xfrm>
             <a:off x="5214888" y="2369631"/>
-            <a:ext cx="1227633" cy="589947"/>
+            <a:ext cx="1248439" cy="681877"/>
           </a:xfrm>
           <a:prstGeom prst="straightConnector1">
             <a:avLst/>
@@ -7873,58 +7774,6 @@
       </p:cxnSp>
       <p:sp>
         <p:nvSpPr>
-          <p:cNvPr id="60" name="矩形 59">
-            <a:extLst>
-              <a:ext uri="{FF2B5EF4-FFF2-40B4-BE49-F238E27FC236}">
-                <a16:creationId xmlns:a16="http://schemas.microsoft.com/office/drawing/2014/main" id="{21BCA351-AAE7-411F-A5CB-4C41156B857E}"/>
-              </a:ext>
-            </a:extLst>
-          </p:cNvPr>
-          <p:cNvSpPr/>
-          <p:nvPr/>
-        </p:nvSpPr>
-        <p:spPr>
-          <a:xfrm>
-            <a:off x="4023534" y="3749029"/>
-            <a:ext cx="1279034" cy="410940"/>
-          </a:xfrm>
-          <a:prstGeom prst="rect">
-            <a:avLst/>
-          </a:prstGeom>
-          <a:solidFill>
-            <a:schemeClr val="bg1"/>
-          </a:solidFill>
-          <a:ln w="57150"/>
-        </p:spPr>
-        <p:style>
-          <a:lnRef idx="2">
-            <a:schemeClr val="accent6"/>
-          </a:lnRef>
-          <a:fillRef idx="1">
-            <a:schemeClr val="lt1"/>
-          </a:fillRef>
-          <a:effectRef idx="0">
-            <a:schemeClr val="accent6"/>
-          </a:effectRef>
-          <a:fontRef idx="minor">
-            <a:schemeClr val="dk1"/>
-          </a:fontRef>
-        </p:style>
-        <p:txBody>
-          <a:bodyPr rtlCol="0" anchor="ctr"/>
-          <a:lstStyle/>
-          <a:p>
-            <a:pPr algn="ctr"/>
-            <a:r>
-              <a:rPr lang="en-US" altLang="zh-CN" b="1" dirty="0"/>
-              <a:t>Mediator</a:t>
-            </a:r>
-            <a:endParaRPr lang="zh-CN" altLang="en-US" b="1" dirty="0"/>
-          </a:p>
-        </p:txBody>
-      </p:sp>
-      <p:sp>
-        <p:nvSpPr>
           <p:cNvPr id="66" name="矩形 65">
             <a:extLst>
               <a:ext uri="{FF2B5EF4-FFF2-40B4-BE49-F238E27FC236}">
@@ -7994,7 +7843,7 @@
         </p:nvGrpSpPr>
         <p:grpSpPr>
           <a:xfrm>
-            <a:off x="2288487" y="2804061"/>
+            <a:off x="2241706" y="2771773"/>
             <a:ext cx="1220125" cy="970409"/>
             <a:chOff x="2080443" y="1105032"/>
             <a:chExt cx="1220125" cy="2969363"/>
@@ -8126,15 +7975,15 @@
           </p:cNvPr>
           <p:cNvCxnSpPr>
             <a:cxnSpLocks/>
-            <a:stCxn id="61" idx="0"/>
+            <a:stCxn id="57" idx="0"/>
             <a:endCxn id="84" idx="2"/>
           </p:cNvCxnSpPr>
           <p:nvPr/>
         </p:nvCxnSpPr>
         <p:spPr>
           <a:xfrm flipV="1">
-            <a:off x="6442521" y="2374136"/>
-            <a:ext cx="1077068" cy="585442"/>
+            <a:off x="6463327" y="2374136"/>
+            <a:ext cx="1056262" cy="677372"/>
           </a:xfrm>
           <a:prstGeom prst="straightConnector1">
             <a:avLst/>
@@ -8176,14 +8025,14 @@
           <p:cNvCxnSpPr>
             <a:cxnSpLocks/>
             <a:stCxn id="157" idx="3"/>
-            <a:endCxn id="61" idx="1"/>
+            <a:endCxn id="57" idx="1"/>
           </p:cNvCxnSpPr>
           <p:nvPr/>
         </p:nvCxnSpPr>
         <p:spPr>
-          <a:xfrm flipV="1">
-            <a:off x="3508612" y="3279558"/>
-            <a:ext cx="2082526" cy="9708"/>
+          <a:xfrm>
+            <a:off x="3461831" y="3256978"/>
+            <a:ext cx="2361979" cy="0"/>
           </a:xfrm>
           <a:prstGeom prst="straightConnector1">
             <a:avLst/>
@@ -8281,15 +8130,15 @@
           </p:cNvPr>
           <p:cNvCxnSpPr>
             <a:cxnSpLocks/>
-            <a:stCxn id="61" idx="2"/>
+            <a:stCxn id="57" idx="2"/>
             <a:endCxn id="118" idx="0"/>
           </p:cNvCxnSpPr>
           <p:nvPr/>
         </p:nvCxnSpPr>
         <p:spPr>
           <a:xfrm flipH="1">
-            <a:off x="5037739" y="3599538"/>
-            <a:ext cx="1404782" cy="888676"/>
+            <a:off x="5037739" y="3462448"/>
+            <a:ext cx="1425588" cy="1025766"/>
           </a:xfrm>
           <a:prstGeom prst="straightConnector1">
             <a:avLst/>
@@ -8324,15 +8173,15 @@
           </p:cNvPr>
           <p:cNvCxnSpPr>
             <a:cxnSpLocks/>
-            <a:stCxn id="61" idx="2"/>
+            <a:stCxn id="57" idx="2"/>
             <a:endCxn id="29" idx="0"/>
           </p:cNvCxnSpPr>
           <p:nvPr/>
         </p:nvCxnSpPr>
         <p:spPr>
           <a:xfrm>
-            <a:off x="6442521" y="3599538"/>
-            <a:ext cx="3219529" cy="890477"/>
+            <a:off x="6463327" y="3462448"/>
+            <a:ext cx="3198723" cy="1027567"/>
           </a:xfrm>
           <a:prstGeom prst="straightConnector1">
             <a:avLst/>
@@ -8367,15 +8216,15 @@
           </p:cNvPr>
           <p:cNvCxnSpPr>
             <a:cxnSpLocks/>
-            <a:stCxn id="61" idx="2"/>
+            <a:stCxn id="57" idx="2"/>
             <a:endCxn id="52" idx="0"/>
           </p:cNvCxnSpPr>
           <p:nvPr/>
         </p:nvCxnSpPr>
         <p:spPr>
           <a:xfrm>
-            <a:off x="6442521" y="3599538"/>
-            <a:ext cx="4708648" cy="888676"/>
+            <a:off x="6463327" y="3462448"/>
+            <a:ext cx="4687842" cy="1025766"/>
           </a:xfrm>
           <a:prstGeom prst="straightConnector1">
             <a:avLst/>
@@ -8410,15 +8259,15 @@
           </p:cNvPr>
           <p:cNvCxnSpPr>
             <a:cxnSpLocks/>
-            <a:stCxn id="61" idx="2"/>
+            <a:stCxn id="57" idx="2"/>
             <a:endCxn id="66" idx="0"/>
           </p:cNvCxnSpPr>
           <p:nvPr/>
         </p:nvCxnSpPr>
         <p:spPr>
           <a:xfrm>
-            <a:off x="6442521" y="3599538"/>
-            <a:ext cx="1643621" cy="895807"/>
+            <a:off x="6463327" y="3462448"/>
+            <a:ext cx="1622815" cy="1032897"/>
           </a:xfrm>
           <a:prstGeom prst="straightConnector1">
             <a:avLst/>
@@ -8554,15 +8403,15 @@
           </p:cNvPr>
           <p:cNvCxnSpPr>
             <a:cxnSpLocks/>
-            <a:stCxn id="61" idx="2"/>
+            <a:stCxn id="57" idx="2"/>
             <a:endCxn id="55" idx="0"/>
           </p:cNvCxnSpPr>
           <p:nvPr/>
         </p:nvCxnSpPr>
         <p:spPr>
           <a:xfrm>
-            <a:off x="6442521" y="3599538"/>
-            <a:ext cx="1048745" cy="2086895"/>
+            <a:off x="6463327" y="3462448"/>
+            <a:ext cx="1027939" cy="2223985"/>
           </a:xfrm>
           <a:prstGeom prst="straightConnector1">
             <a:avLst/>
@@ -8646,6 +8495,58 @@
                 <a:schemeClr val="dk1"/>
               </a:solidFill>
             </a:endParaRPr>
+          </a:p>
+        </p:txBody>
+      </p:sp>
+      <p:sp>
+        <p:nvSpPr>
+          <p:cNvPr id="57" name="矩形 56">
+            <a:extLst>
+              <a:ext uri="{FF2B5EF4-FFF2-40B4-BE49-F238E27FC236}">
+                <a16:creationId xmlns:a16="http://schemas.microsoft.com/office/drawing/2014/main" id="{617B32AC-8893-4EC9-B60F-1B8EC3985607}"/>
+              </a:ext>
+            </a:extLst>
+          </p:cNvPr>
+          <p:cNvSpPr/>
+          <p:nvPr/>
+        </p:nvSpPr>
+        <p:spPr>
+          <a:xfrm>
+            <a:off x="5823810" y="3051508"/>
+            <a:ext cx="1279034" cy="410940"/>
+          </a:xfrm>
+          <a:prstGeom prst="rect">
+            <a:avLst/>
+          </a:prstGeom>
+          <a:solidFill>
+            <a:schemeClr val="bg1"/>
+          </a:solidFill>
+          <a:ln w="57150"/>
+        </p:spPr>
+        <p:style>
+          <a:lnRef idx="2">
+            <a:schemeClr val="accent6"/>
+          </a:lnRef>
+          <a:fillRef idx="1">
+            <a:schemeClr val="lt1"/>
+          </a:fillRef>
+          <a:effectRef idx="0">
+            <a:schemeClr val="accent6"/>
+          </a:effectRef>
+          <a:fontRef idx="minor">
+            <a:schemeClr val="dk1"/>
+          </a:fontRef>
+        </p:style>
+        <p:txBody>
+          <a:bodyPr rtlCol="0" anchor="ctr"/>
+          <a:lstStyle/>
+          <a:p>
+            <a:pPr algn="ctr"/>
+            <a:r>
+              <a:rPr lang="en-US" altLang="zh-CN" b="1" dirty="0"/>
+              <a:t>Mediator</a:t>
+            </a:r>
+            <a:endParaRPr lang="zh-CN" altLang="en-US" b="1" dirty="0"/>
           </a:p>
         </p:txBody>
       </p:sp>
@@ -9435,7 +9336,7 @@
         <p:spPr>
           <a:xfrm>
             <a:off x="615716" y="6200487"/>
-            <a:ext cx="8424101" cy="584775"/>
+            <a:ext cx="5961888" cy="584775"/>
           </a:xfrm>
           <a:prstGeom prst="rect">
             <a:avLst/>
@@ -9458,7 +9359,7 @@
             </a:r>
             <a:r>
               <a:rPr lang="zh-CN" altLang="en-US" sz="3200" dirty="0"/>
-              <a:t>上，工作量较大</a:t>
+              <a:t>上</a:t>
             </a:r>
           </a:p>
         </p:txBody>

</xml_diff>

<commit_message>
refactor messageAgent; add VNFControllerTest
</commit_message>
<xml_diff>
--- a/doc/SoftwareDesign/Architecture-P4.pptx
+++ b/doc/SoftwareDesign/Architecture-P4.pptx
@@ -202,7 +202,7 @@
           <a:p>
             <a:fld id="{B81778B8-8763-4D18-BF72-76154464FFE0}" type="datetimeFigureOut">
               <a:rPr lang="zh-CN" altLang="en-US" smtClean="0"/>
-              <a:t>2020/8/21</a:t>
+              <a:t>2020/9/1</a:t>
             </a:fld>
             <a:endParaRPr lang="zh-CN" altLang="en-US"/>
           </a:p>
@@ -2957,7 +2957,7 @@
           <a:p>
             <a:fld id="{6BBD34C2-3600-48BE-9702-B8B5DAB8968A}" type="datetimeFigureOut">
               <a:rPr lang="zh-CN" altLang="en-US" smtClean="0"/>
-              <a:t>2020/8/21</a:t>
+              <a:t>2020/9/1</a:t>
             </a:fld>
             <a:endParaRPr lang="zh-CN" altLang="en-US"/>
           </a:p>
@@ -3155,7 +3155,7 @@
           <a:p>
             <a:fld id="{6BBD34C2-3600-48BE-9702-B8B5DAB8968A}" type="datetimeFigureOut">
               <a:rPr lang="zh-CN" altLang="en-US" smtClean="0"/>
-              <a:t>2020/8/21</a:t>
+              <a:t>2020/9/1</a:t>
             </a:fld>
             <a:endParaRPr lang="zh-CN" altLang="en-US"/>
           </a:p>
@@ -3363,7 +3363,7 @@
           <a:p>
             <a:fld id="{6BBD34C2-3600-48BE-9702-B8B5DAB8968A}" type="datetimeFigureOut">
               <a:rPr lang="zh-CN" altLang="en-US" smtClean="0"/>
-              <a:t>2020/8/21</a:t>
+              <a:t>2020/9/1</a:t>
             </a:fld>
             <a:endParaRPr lang="zh-CN" altLang="en-US"/>
           </a:p>
@@ -3561,7 +3561,7 @@
           <a:p>
             <a:fld id="{6BBD34C2-3600-48BE-9702-B8B5DAB8968A}" type="datetimeFigureOut">
               <a:rPr lang="zh-CN" altLang="en-US" smtClean="0"/>
-              <a:t>2020/8/21</a:t>
+              <a:t>2020/9/1</a:t>
             </a:fld>
             <a:endParaRPr lang="zh-CN" altLang="en-US"/>
           </a:p>
@@ -3836,7 +3836,7 @@
           <a:p>
             <a:fld id="{6BBD34C2-3600-48BE-9702-B8B5DAB8968A}" type="datetimeFigureOut">
               <a:rPr lang="zh-CN" altLang="en-US" smtClean="0"/>
-              <a:t>2020/8/21</a:t>
+              <a:t>2020/9/1</a:t>
             </a:fld>
             <a:endParaRPr lang="zh-CN" altLang="en-US"/>
           </a:p>
@@ -4101,7 +4101,7 @@
           <a:p>
             <a:fld id="{6BBD34C2-3600-48BE-9702-B8B5DAB8968A}" type="datetimeFigureOut">
               <a:rPr lang="zh-CN" altLang="en-US" smtClean="0"/>
-              <a:t>2020/8/21</a:t>
+              <a:t>2020/9/1</a:t>
             </a:fld>
             <a:endParaRPr lang="zh-CN" altLang="en-US"/>
           </a:p>
@@ -4513,7 +4513,7 @@
           <a:p>
             <a:fld id="{6BBD34C2-3600-48BE-9702-B8B5DAB8968A}" type="datetimeFigureOut">
               <a:rPr lang="zh-CN" altLang="en-US" smtClean="0"/>
-              <a:t>2020/8/21</a:t>
+              <a:t>2020/9/1</a:t>
             </a:fld>
             <a:endParaRPr lang="zh-CN" altLang="en-US"/>
           </a:p>
@@ -4654,7 +4654,7 @@
           <a:p>
             <a:fld id="{6BBD34C2-3600-48BE-9702-B8B5DAB8968A}" type="datetimeFigureOut">
               <a:rPr lang="zh-CN" altLang="en-US" smtClean="0"/>
-              <a:t>2020/8/21</a:t>
+              <a:t>2020/9/1</a:t>
             </a:fld>
             <a:endParaRPr lang="zh-CN" altLang="en-US"/>
           </a:p>
@@ -4767,7 +4767,7 @@
           <a:p>
             <a:fld id="{6BBD34C2-3600-48BE-9702-B8B5DAB8968A}" type="datetimeFigureOut">
               <a:rPr lang="zh-CN" altLang="en-US" smtClean="0"/>
-              <a:t>2020/8/21</a:t>
+              <a:t>2020/9/1</a:t>
             </a:fld>
             <a:endParaRPr lang="zh-CN" altLang="en-US"/>
           </a:p>
@@ -5078,7 +5078,7 @@
           <a:p>
             <a:fld id="{6BBD34C2-3600-48BE-9702-B8B5DAB8968A}" type="datetimeFigureOut">
               <a:rPr lang="zh-CN" altLang="en-US" smtClean="0"/>
-              <a:t>2020/8/21</a:t>
+              <a:t>2020/9/1</a:t>
             </a:fld>
             <a:endParaRPr lang="zh-CN" altLang="en-US"/>
           </a:p>
@@ -5366,7 +5366,7 @@
           <a:p>
             <a:fld id="{6BBD34C2-3600-48BE-9702-B8B5DAB8968A}" type="datetimeFigureOut">
               <a:rPr lang="zh-CN" altLang="en-US" smtClean="0"/>
-              <a:t>2020/8/21</a:t>
+              <a:t>2020/9/1</a:t>
             </a:fld>
             <a:endParaRPr lang="zh-CN" altLang="en-US"/>
           </a:p>
@@ -5607,7 +5607,7 @@
           <a:p>
             <a:fld id="{6BBD34C2-3600-48BE-9702-B8B5DAB8968A}" type="datetimeFigureOut">
               <a:rPr lang="zh-CN" altLang="en-US" smtClean="0"/>
-              <a:t>2020/8/21</a:t>
+              <a:t>2020/9/1</a:t>
             </a:fld>
             <a:endParaRPr lang="zh-CN" altLang="en-US"/>
           </a:p>
@@ -6835,7 +6835,7 @@
             <a:pPr algn="ctr"/>
             <a:r>
               <a:rPr lang="en-US" altLang="zh-CN" dirty="0"/>
-              <a:t>BESS </a:t>
+              <a:t>SFF </a:t>
             </a:r>
           </a:p>
           <a:p>
@@ -7297,7 +7297,7 @@
             <a:pPr algn="ctr"/>
             <a:r>
               <a:rPr lang="en-US" altLang="zh-CN" dirty="0"/>
-              <a:t>Docker</a:t>
+              <a:t>VNF</a:t>
             </a:r>
           </a:p>
           <a:p>

</xml_diff>